<commit_message>
add task 2; update ppt
</commit_message>
<xml_diff>
--- a/docs/DM1.pptx
+++ b/docs/DM1.pptx
@@ -9,14 +9,14 @@
   </p:notesMasterIdLst>
   <p:sldIdLst>
     <p:sldId id="256" r:id="rId2"/>
-    <p:sldId id="351" r:id="rId3"/>
-    <p:sldId id="357" r:id="rId4"/>
-    <p:sldId id="346" r:id="rId5"/>
-    <p:sldId id="347" r:id="rId6"/>
-    <p:sldId id="348" r:id="rId7"/>
-    <p:sldId id="349" r:id="rId8"/>
-    <p:sldId id="350" r:id="rId9"/>
-    <p:sldId id="352" r:id="rId10"/>
+    <p:sldId id="357" r:id="rId3"/>
+    <p:sldId id="358" r:id="rId4"/>
+    <p:sldId id="359" r:id="rId5"/>
+    <p:sldId id="360" r:id="rId6"/>
+    <p:sldId id="361" r:id="rId7"/>
+    <p:sldId id="362" r:id="rId8"/>
+    <p:sldId id="363" r:id="rId9"/>
+    <p:sldId id="351" r:id="rId10"/>
     <p:sldId id="356" r:id="rId11"/>
     <p:sldId id="353" r:id="rId12"/>
     <p:sldId id="354" r:id="rId13"/>
@@ -27085,7 +27085,7 @@
                 <a:effectLst/>
                 <a:latin typeface="Söhne"/>
               </a:rPr>
-              <a:t>KNN has the highest </a:t>
+              <a:t>DT has the highest </a:t>
             </a:r>
             <a:r>
               <a:rPr lang="en-US" b="1" i="0" dirty="0">
@@ -27105,7 +27105,7 @@
                 <a:effectLst/>
                 <a:latin typeface="Söhne"/>
               </a:rPr>
-              <a:t>(85.94%) and</a:t>
+              <a:t>(90.62%), and NN has the highest </a:t>
             </a:r>
             <a:r>
               <a:rPr lang="en-US" b="1" i="0" dirty="0">
@@ -27115,7 +27115,7 @@
                 <a:effectLst/>
                 <a:latin typeface="Söhne"/>
               </a:rPr>
-              <a:t> accuracy</a:t>
+              <a:t>accuracy</a:t>
             </a:r>
             <a:r>
               <a:rPr lang="en-US" i="0" dirty="0">
@@ -27125,7 +27125,7 @@
                 <a:effectLst/>
                 <a:latin typeface="Söhne"/>
               </a:rPr>
-              <a:t> (74.07%) score and SVM has the highest </a:t>
+              <a:t> (83.95%), </a:t>
             </a:r>
             <a:r>
               <a:rPr lang="en-US" b="1" i="0" dirty="0">
@@ -27145,7 +27145,7 @@
                 <a:effectLst/>
                 <a:latin typeface="Söhne"/>
               </a:rPr>
-              <a:t>(86.57%) and </a:t>
+              <a:t>(97.01%) and </a:t>
             </a:r>
             <a:r>
               <a:rPr lang="en-US" b="1" i="0" dirty="0">
@@ -27165,7 +27165,26 @@
                 <a:effectLst/>
                 <a:latin typeface="Söhne"/>
               </a:rPr>
-              <a:t> (84.06%) score.</a:t>
+              <a:t> (</a:t>
+            </a:r>
+            <a:r>
+              <a:rPr lang="en-US" dirty="0">
+                <a:solidFill>
+                  <a:srgbClr val="335B74"/>
+                </a:solidFill>
+                <a:latin typeface="Söhne"/>
+              </a:rPr>
+              <a:t>90.91</a:t>
+            </a:r>
+            <a:r>
+              <a:rPr lang="en-US" i="0" dirty="0">
+                <a:solidFill>
+                  <a:srgbClr val="335B74"/>
+                </a:solidFill>
+                <a:effectLst/>
+                <a:latin typeface="Söhne"/>
+              </a:rPr>
+              <a:t>%) score.</a:t>
             </a:r>
           </a:p>
           <a:p>
@@ -27199,7 +27218,7 @@
                 <a:effectLst/>
                 <a:latin typeface="Söhne"/>
               </a:rPr>
-              <a:t>NN has the highest </a:t>
+              <a:t>DT has the highest </a:t>
             </a:r>
             <a:r>
               <a:rPr lang="en-US" b="1" i="0" dirty="0">
@@ -27219,41 +27238,11 @@
                 <a:effectLst/>
                 <a:latin typeface="Söhne"/>
               </a:rPr>
-              <a:t>(0.65).</a:t>
+              <a:t>(0.81).</a:t>
             </a:r>
           </a:p>
         </p:txBody>
       </p:sp>
-      <p:pic>
-        <p:nvPicPr>
-          <p:cNvPr id="4" name="Picture 3">
-            <a:extLst>
-              <a:ext uri="{FF2B5EF4-FFF2-40B4-BE49-F238E27FC236}">
-                <a16:creationId xmlns:a16="http://schemas.microsoft.com/office/drawing/2014/main" id="{170E1AAC-DDC4-011E-D940-2F3C56BBFE99}"/>
-              </a:ext>
-            </a:extLst>
-          </p:cNvPr>
-          <p:cNvPicPr>
-            <a:picLocks noChangeAspect="1"/>
-          </p:cNvPicPr>
-          <p:nvPr/>
-        </p:nvPicPr>
-        <p:blipFill>
-          <a:blip r:embed="rId2"/>
-          <a:stretch>
-            <a:fillRect/>
-          </a:stretch>
-        </p:blipFill>
-        <p:spPr>
-          <a:xfrm>
-            <a:off x="5352586" y="1471010"/>
-            <a:ext cx="3622641" cy="2715536"/>
-          </a:xfrm>
-          <a:prstGeom prst="rect">
-            <a:avLst/>
-          </a:prstGeom>
-        </p:spPr>
-      </p:pic>
       <p:sp>
         <p:nvSpPr>
           <p:cNvPr id="5" name="Google Shape;434;p52">
@@ -27350,6 +27339,96 @@
           </a:p>
         </p:txBody>
       </p:sp>
+      <p:pic>
+        <p:nvPicPr>
+          <p:cNvPr id="8" name="Picture 7">
+            <a:extLst>
+              <a:ext uri="{FF2B5EF4-FFF2-40B4-BE49-F238E27FC236}">
+                <a16:creationId xmlns:a16="http://schemas.microsoft.com/office/drawing/2014/main" id="{B6E09A93-187F-6E24-ABA6-A165236CE3AB}"/>
+              </a:ext>
+            </a:extLst>
+          </p:cNvPr>
+          <p:cNvPicPr>
+            <a:picLocks noChangeAspect="1"/>
+          </p:cNvPicPr>
+          <p:nvPr/>
+        </p:nvPicPr>
+        <p:blipFill>
+          <a:blip r:embed="rId2"/>
+          <a:stretch>
+            <a:fillRect/>
+          </a:stretch>
+        </p:blipFill>
+        <p:spPr>
+          <a:xfrm>
+            <a:off x="209615" y="2792154"/>
+            <a:ext cx="2651569" cy="2087309"/>
+          </a:xfrm>
+          <a:prstGeom prst="rect">
+            <a:avLst/>
+          </a:prstGeom>
+        </p:spPr>
+      </p:pic>
+      <p:pic>
+        <p:nvPicPr>
+          <p:cNvPr id="4" name="Picture 3">
+            <a:extLst>
+              <a:ext uri="{FF2B5EF4-FFF2-40B4-BE49-F238E27FC236}">
+                <a16:creationId xmlns:a16="http://schemas.microsoft.com/office/drawing/2014/main" id="{6E30F45A-EB6C-2D96-409E-7DB88852CF9F}"/>
+              </a:ext>
+            </a:extLst>
+          </p:cNvPr>
+          <p:cNvPicPr>
+            <a:picLocks noChangeAspect="1"/>
+          </p:cNvPicPr>
+          <p:nvPr/>
+        </p:nvPicPr>
+        <p:blipFill>
+          <a:blip r:embed="rId3"/>
+          <a:stretch>
+            <a:fillRect/>
+          </a:stretch>
+        </p:blipFill>
+        <p:spPr>
+          <a:xfrm>
+            <a:off x="5752227" y="1446900"/>
+            <a:ext cx="3391773" cy="2542478"/>
+          </a:xfrm>
+          <a:prstGeom prst="rect">
+            <a:avLst/>
+          </a:prstGeom>
+        </p:spPr>
+      </p:pic>
+      <p:pic>
+        <p:nvPicPr>
+          <p:cNvPr id="9" name="Picture 8">
+            <a:extLst>
+              <a:ext uri="{FF2B5EF4-FFF2-40B4-BE49-F238E27FC236}">
+                <a16:creationId xmlns:a16="http://schemas.microsoft.com/office/drawing/2014/main" id="{4E73A079-9909-4CE5-7F53-ED84DA4F38F5}"/>
+              </a:ext>
+            </a:extLst>
+          </p:cNvPr>
+          <p:cNvPicPr>
+            <a:picLocks noChangeAspect="1"/>
+          </p:cNvPicPr>
+          <p:nvPr/>
+        </p:nvPicPr>
+        <p:blipFill>
+          <a:blip r:embed="rId4"/>
+          <a:stretch>
+            <a:fillRect/>
+          </a:stretch>
+        </p:blipFill>
+        <p:spPr>
+          <a:xfrm>
+            <a:off x="3044643" y="2752340"/>
+            <a:ext cx="2524125" cy="2166938"/>
+          </a:xfrm>
+          <a:prstGeom prst="rect">
+            <a:avLst/>
+          </a:prstGeom>
+        </p:spPr>
+      </p:pic>
     </p:spTree>
     <p:extLst>
       <p:ext uri="{BB962C8B-B14F-4D97-AF65-F5344CB8AC3E}">
@@ -27674,347 +27753,6 @@
 </file>
 
 <file path=ppt/slides/slide2.xml><?xml version="1.0" encoding="utf-8"?>
-<p:sld xmlns:a="http://schemas.openxmlformats.org/drawingml/2006/main" xmlns:r="http://schemas.openxmlformats.org/officeDocument/2006/relationships" xmlns:p="http://schemas.openxmlformats.org/presentationml/2006/main">
-  <p:cSld>
-    <p:spTree>
-      <p:nvGrpSpPr>
-        <p:cNvPr id="1" name=""/>
-        <p:cNvGrpSpPr/>
-        <p:nvPr/>
-      </p:nvGrpSpPr>
-      <p:grpSpPr>
-        <a:xfrm>
-          <a:off x="0" y="0"/>
-          <a:ext cx="0" cy="0"/>
-          <a:chOff x="0" y="0"/>
-          <a:chExt cx="0" cy="0"/>
-        </a:xfrm>
-      </p:grpSpPr>
-      <p:sp>
-        <p:nvSpPr>
-          <p:cNvPr id="14" name="Title 13">
-            <a:extLst>
-              <a:ext uri="{FF2B5EF4-FFF2-40B4-BE49-F238E27FC236}">
-                <a16:creationId xmlns:a16="http://schemas.microsoft.com/office/drawing/2014/main" id="{CC84196D-2419-473F-B767-04FB276E2EFD}"/>
-              </a:ext>
-            </a:extLst>
-          </p:cNvPr>
-          <p:cNvSpPr>
-            <a:spLocks noGrp="1"/>
-          </p:cNvSpPr>
-          <p:nvPr>
-            <p:ph type="title" idx="15"/>
-          </p:nvPr>
-        </p:nvSpPr>
-        <p:spPr/>
-        <p:txBody>
-          <a:bodyPr/>
-          <a:lstStyle/>
-          <a:p>
-            <a:r>
-              <a:rPr lang="pt-PT" sz="2800" dirty="0"/>
-              <a:t>(?)</a:t>
-            </a:r>
-          </a:p>
-        </p:txBody>
-      </p:sp>
-      <p:sp>
-        <p:nvSpPr>
-          <p:cNvPr id="3" name="TextBox 2">
-            <a:extLst>
-              <a:ext uri="{FF2B5EF4-FFF2-40B4-BE49-F238E27FC236}">
-                <a16:creationId xmlns:a16="http://schemas.microsoft.com/office/drawing/2014/main" id="{301DBBFF-0235-0A37-44DC-2796408B1FEB}"/>
-              </a:ext>
-            </a:extLst>
-          </p:cNvPr>
-          <p:cNvSpPr txBox="1"/>
-          <p:nvPr/>
-        </p:nvSpPr>
-        <p:spPr>
-          <a:xfrm>
-            <a:off x="720000" y="1378527"/>
-            <a:ext cx="7329491" cy="1815882"/>
-          </a:xfrm>
-          <a:prstGeom prst="rect">
-            <a:avLst/>
-          </a:prstGeom>
-          <a:noFill/>
-        </p:spPr>
-        <p:txBody>
-          <a:bodyPr wrap="square" rtlCol="0">
-            <a:spAutoFit/>
-          </a:bodyPr>
-          <a:lstStyle/>
-          <a:p>
-            <a:pPr marL="285750" indent="-285750" algn="l">
-              <a:buClr>
-                <a:srgbClr val="335B74"/>
-              </a:buClr>
-              <a:buFont typeface="Arial" panose="020B0604020202020204" pitchFamily="34" charset="0"/>
-              <a:buChar char="•"/>
-            </a:pPr>
-            <a:r>
-              <a:rPr lang="en-US" b="1" i="0" dirty="0">
-                <a:solidFill>
-                  <a:srgbClr val="335B74"/>
-                </a:solidFill>
-                <a:effectLst/>
-                <a:latin typeface="Söhne"/>
-              </a:rPr>
-              <a:t>Imbalanced Data:</a:t>
-            </a:r>
-            <a:r>
-              <a:rPr lang="en-US" b="0" i="0" dirty="0">
-                <a:solidFill>
-                  <a:srgbClr val="335B74"/>
-                </a:solidFill>
-                <a:effectLst/>
-                <a:latin typeface="Söhne"/>
-              </a:rPr>
-              <a:t> We use SMOTE (Synthetic Minority Over-sampling Technique) to address class imbalance in the target variable.</a:t>
-            </a:r>
-          </a:p>
-          <a:p>
-            <a:pPr marL="285750" indent="-285750" algn="l">
-              <a:buClr>
-                <a:srgbClr val="335B74"/>
-              </a:buClr>
-              <a:buFont typeface="Arial" panose="020B0604020202020204" pitchFamily="34" charset="0"/>
-              <a:buChar char="•"/>
-            </a:pPr>
-            <a:endParaRPr lang="en-US" b="0" i="0" dirty="0">
-              <a:solidFill>
-                <a:srgbClr val="335B74"/>
-              </a:solidFill>
-              <a:effectLst/>
-              <a:latin typeface="Söhne"/>
-            </a:endParaRPr>
-          </a:p>
-          <a:p>
-            <a:pPr marL="285750" lvl="1" indent="-285750">
-              <a:buClr>
-                <a:srgbClr val="335B74"/>
-              </a:buClr>
-              <a:buFont typeface="Arial" panose="020B0604020202020204" pitchFamily="34" charset="0"/>
-              <a:buChar char="•"/>
-            </a:pPr>
-            <a:r>
-              <a:rPr lang="en-US" b="1" i="0" dirty="0">
-                <a:solidFill>
-                  <a:srgbClr val="335B74"/>
-                </a:solidFill>
-                <a:effectLst/>
-                <a:latin typeface="Söhne"/>
-              </a:rPr>
-              <a:t>Feature Scaling:</a:t>
-            </a:r>
-            <a:r>
-              <a:rPr lang="en-US" b="0" i="0" dirty="0">
-                <a:solidFill>
-                  <a:srgbClr val="335B74"/>
-                </a:solidFill>
-                <a:effectLst/>
-                <a:latin typeface="Söhne"/>
-              </a:rPr>
-              <a:t> </a:t>
-            </a:r>
-            <a:r>
-              <a:rPr lang="en-US" dirty="0">
-                <a:solidFill>
-                  <a:srgbClr val="335B74"/>
-                </a:solidFill>
-                <a:latin typeface="Söhne"/>
-              </a:rPr>
-              <a:t>T</a:t>
-            </a:r>
-            <a:r>
-              <a:rPr lang="en-US" b="0" i="0" dirty="0">
-                <a:solidFill>
-                  <a:srgbClr val="335B74"/>
-                </a:solidFill>
-                <a:effectLst/>
-                <a:latin typeface="Söhne"/>
-              </a:rPr>
-              <a:t>o ensure that all features contributed equally to the model we use feature scaling using </a:t>
-            </a:r>
-            <a:r>
-              <a:rPr lang="en-US" b="0" i="0" dirty="0" err="1">
-                <a:solidFill>
-                  <a:srgbClr val="335B74"/>
-                </a:solidFill>
-                <a:effectLst/>
-                <a:latin typeface="Söhne"/>
-              </a:rPr>
-              <a:t>StandardScaler</a:t>
-            </a:r>
-            <a:r>
-              <a:rPr lang="en-US" b="0" i="0" dirty="0">
-                <a:solidFill>
-                  <a:srgbClr val="335B74"/>
-                </a:solidFill>
-                <a:effectLst/>
-                <a:latin typeface="Söhne"/>
-              </a:rPr>
-              <a:t>.</a:t>
-            </a:r>
-          </a:p>
-          <a:p>
-            <a:pPr marL="285750" lvl="1" indent="-285750">
-              <a:buClr>
-                <a:srgbClr val="335B74"/>
-              </a:buClr>
-              <a:buFont typeface="Arial" panose="020B0604020202020204" pitchFamily="34" charset="0"/>
-              <a:buChar char="•"/>
-            </a:pPr>
-            <a:endParaRPr lang="en-US" b="0" i="0" dirty="0">
-              <a:solidFill>
-                <a:srgbClr val="335B74"/>
-              </a:solidFill>
-              <a:effectLst/>
-              <a:latin typeface="Söhne"/>
-            </a:endParaRPr>
-          </a:p>
-          <a:p>
-            <a:pPr marL="285750" indent="-285750" algn="l">
-              <a:buClr>
-                <a:srgbClr val="335B74"/>
-              </a:buClr>
-              <a:buFont typeface="Arial" panose="020B0604020202020204" pitchFamily="34" charset="0"/>
-              <a:buChar char="•"/>
-            </a:pPr>
-            <a:r>
-              <a:rPr lang="en-US" b="1" i="0" dirty="0">
-                <a:solidFill>
-                  <a:srgbClr val="335B74"/>
-                </a:solidFill>
-                <a:effectLst/>
-                <a:latin typeface="Söhne"/>
-              </a:rPr>
-              <a:t>Dimensionality Reduction:</a:t>
-            </a:r>
-            <a:r>
-              <a:rPr lang="en-US" b="0" i="0" dirty="0">
-                <a:solidFill>
-                  <a:srgbClr val="335B74"/>
-                </a:solidFill>
-                <a:effectLst/>
-                <a:latin typeface="Söhne"/>
-              </a:rPr>
-              <a:t> We use PCA (Principal Component Analysis) to reduce the number of features while retaining essential information.</a:t>
-            </a:r>
-          </a:p>
-        </p:txBody>
-      </p:sp>
-      <p:sp>
-        <p:nvSpPr>
-          <p:cNvPr id="2" name="Google Shape;434;p52">
-            <a:extLst>
-              <a:ext uri="{FF2B5EF4-FFF2-40B4-BE49-F238E27FC236}">
-                <a16:creationId xmlns:a16="http://schemas.microsoft.com/office/drawing/2014/main" id="{9DD58EF7-0644-2403-1852-B532203B17F4}"/>
-              </a:ext>
-            </a:extLst>
-          </p:cNvPr>
-          <p:cNvSpPr/>
-          <p:nvPr/>
-        </p:nvSpPr>
-        <p:spPr>
-          <a:xfrm flipH="1">
-            <a:off x="8310713" y="4424516"/>
-            <a:ext cx="1401099" cy="1253612"/>
-          </a:xfrm>
-          <a:custGeom>
-            <a:avLst/>
-            <a:gdLst/>
-            <a:ahLst/>
-            <a:cxnLst/>
-            <a:rect l="l" t="t" r="r" b="b"/>
-            <a:pathLst>
-              <a:path w="11409" h="11443" extrusionOk="0">
-                <a:moveTo>
-                  <a:pt x="5705" y="1"/>
-                </a:moveTo>
-                <a:cubicBezTo>
-                  <a:pt x="2569" y="1"/>
-                  <a:pt x="1" y="2569"/>
-                  <a:pt x="1" y="5738"/>
-                </a:cubicBezTo>
-                <a:cubicBezTo>
-                  <a:pt x="1" y="8874"/>
-                  <a:pt x="2569" y="11442"/>
-                  <a:pt x="5705" y="11442"/>
-                </a:cubicBezTo>
-                <a:cubicBezTo>
-                  <a:pt x="8874" y="11442"/>
-                  <a:pt x="11409" y="8874"/>
-                  <a:pt x="11409" y="5738"/>
-                </a:cubicBezTo>
-                <a:cubicBezTo>
-                  <a:pt x="11409" y="2569"/>
-                  <a:pt x="8874" y="1"/>
-                  <a:pt x="5705" y="1"/>
-                </a:cubicBezTo>
-                <a:close/>
-              </a:path>
-            </a:pathLst>
-          </a:custGeom>
-          <a:solidFill>
-            <a:srgbClr val="F3AC3D"/>
-          </a:solidFill>
-          <a:ln>
-            <a:noFill/>
-          </a:ln>
-        </p:spPr>
-        <p:txBody>
-          <a:bodyPr spcFirstLastPara="1" wrap="square" lIns="91425" tIns="91425" rIns="91425" bIns="91425" anchor="ctr" anchorCtr="0">
-            <a:noAutofit/>
-          </a:bodyPr>
-          <a:lstStyle/>
-          <a:p>
-            <a:pPr marL="0" marR="0" lvl="0" indent="0" defTabSz="914400" eaLnBrk="1" fontAlgn="auto" latinLnBrk="0" hangingPunct="1">
-              <a:lnSpc>
-                <a:spcPct val="100000"/>
-              </a:lnSpc>
-              <a:spcBef>
-                <a:spcPts val="0"/>
-              </a:spcBef>
-              <a:spcAft>
-                <a:spcPts val="0"/>
-              </a:spcAft>
-              <a:buClrTx/>
-              <a:buSzTx/>
-              <a:buFontTx/>
-              <a:buNone/>
-              <a:tabLst/>
-              <a:defRPr/>
-            </a:pPr>
-            <a:endParaRPr kumimoji="0" sz="1800" b="0" i="0" u="none" strike="noStrike" kern="0" cap="none" spc="0" normalizeH="0" baseline="0" noProof="0">
-              <a:ln>
-                <a:noFill/>
-              </a:ln>
-              <a:solidFill>
-                <a:sysClr val="windowText" lastClr="000000"/>
-              </a:solidFill>
-              <a:effectLst/>
-              <a:uLnTx/>
-              <a:uFillTx/>
-            </a:endParaRPr>
-          </a:p>
-        </p:txBody>
-      </p:sp>
-    </p:spTree>
-    <p:extLst>
-      <p:ext uri="{BB962C8B-B14F-4D97-AF65-F5344CB8AC3E}">
-        <p14:creationId xmlns:p14="http://schemas.microsoft.com/office/powerpoint/2010/main" val="3936280051"/>
-      </p:ext>
-    </p:extLst>
-  </p:cSld>
-  <p:clrMapOvr>
-    <a:masterClrMapping/>
-  </p:clrMapOvr>
-</p:sld>
-</file>
-
-<file path=ppt/slides/slide3.xml><?xml version="1.0" encoding="utf-8"?>
 <p:sld xmlns:a="http://schemas.openxmlformats.org/drawingml/2006/main" xmlns:r="http://schemas.openxmlformats.org/officeDocument/2006/relationships" xmlns:p="http://schemas.openxmlformats.org/presentationml/2006/main">
   <p:cSld>
     <p:spTree>
@@ -28225,7 +27963,7 @@
 </p:sld>
 </file>
 
-<file path=ppt/slides/slide4.xml><?xml version="1.0" encoding="utf-8"?>
+<file path=ppt/slides/slide3.xml><?xml version="1.0" encoding="utf-8"?>
 <p:sld xmlns:a="http://schemas.openxmlformats.org/drawingml/2006/main" xmlns:r="http://schemas.openxmlformats.org/officeDocument/2006/relationships" xmlns:p="http://schemas.openxmlformats.org/presentationml/2006/main">
   <p:cSld>
     <p:spTree>
@@ -28277,10 +28015,198 @@
       </p:sp>
       <p:sp>
         <p:nvSpPr>
-          <p:cNvPr id="3" name="Google Shape;434;p52">
+          <p:cNvPr id="3" name="TextBox 2">
             <a:extLst>
               <a:ext uri="{FF2B5EF4-FFF2-40B4-BE49-F238E27FC236}">
-                <a16:creationId xmlns:a16="http://schemas.microsoft.com/office/drawing/2014/main" id="{2355284E-F0B7-3024-9A39-FEF5132D94DB}"/>
+                <a16:creationId xmlns:a16="http://schemas.microsoft.com/office/drawing/2014/main" id="{301DBBFF-0235-0A37-44DC-2796408B1FEB}"/>
+              </a:ext>
+            </a:extLst>
+          </p:cNvPr>
+          <p:cNvSpPr txBox="1"/>
+          <p:nvPr/>
+        </p:nvSpPr>
+        <p:spPr>
+          <a:xfrm>
+            <a:off x="720000" y="1378527"/>
+            <a:ext cx="7329491" cy="2677656"/>
+          </a:xfrm>
+          <a:prstGeom prst="rect">
+            <a:avLst/>
+          </a:prstGeom>
+          <a:noFill/>
+        </p:spPr>
+        <p:txBody>
+          <a:bodyPr wrap="square" rtlCol="0">
+            <a:spAutoFit/>
+          </a:bodyPr>
+          <a:lstStyle/>
+          <a:p>
+            <a:pPr marL="285750" indent="-285750" algn="just">
+              <a:buClr>
+                <a:srgbClr val="335B74"/>
+              </a:buClr>
+              <a:buFont typeface="Arial" panose="020B0604020202020204" pitchFamily="34" charset="0"/>
+              <a:buChar char="•"/>
+            </a:pPr>
+            <a:r>
+              <a:rPr lang="en-US" b="0" dirty="0">
+                <a:solidFill>
+                  <a:srgbClr val="335B74"/>
+                </a:solidFill>
+                <a:effectLst/>
+                <a:latin typeface="Söhne"/>
+              </a:rPr>
+              <a:t>Data understanding is a vital step, especially so in a dataset with, as we’ll see, so much diversified data as this one.</a:t>
+            </a:r>
+          </a:p>
+          <a:p>
+            <a:pPr marL="285750" indent="-285750" algn="just">
+              <a:buClr>
+                <a:srgbClr val="335B74"/>
+              </a:buClr>
+              <a:buFont typeface="Arial" panose="020B0604020202020204" pitchFamily="34" charset="0"/>
+              <a:buChar char="•"/>
+            </a:pPr>
+            <a:endParaRPr lang="en-US" b="0" dirty="0">
+              <a:solidFill>
+                <a:srgbClr val="335B74"/>
+              </a:solidFill>
+              <a:effectLst/>
+              <a:latin typeface="Söhne"/>
+            </a:endParaRPr>
+          </a:p>
+          <a:p>
+            <a:pPr marL="285750" indent="-285750" algn="just">
+              <a:buClr>
+                <a:srgbClr val="335B74"/>
+              </a:buClr>
+              <a:buFont typeface="Arial" panose="020B0604020202020204" pitchFamily="34" charset="0"/>
+              <a:buChar char="•"/>
+            </a:pPr>
+            <a:r>
+              <a:rPr lang="en-US" b="0" dirty="0">
+                <a:solidFill>
+                  <a:srgbClr val="335B74"/>
+                </a:solidFill>
+                <a:effectLst/>
+                <a:latin typeface="Söhne"/>
+              </a:rPr>
+              <a:t>Data is scattered on various files, linked in a relational manner.</a:t>
+            </a:r>
+          </a:p>
+          <a:p>
+            <a:pPr marL="285750" indent="-285750" algn="just">
+              <a:buClr>
+                <a:srgbClr val="335B74"/>
+              </a:buClr>
+              <a:buFont typeface="Arial" panose="020B0604020202020204" pitchFamily="34" charset="0"/>
+              <a:buChar char="•"/>
+            </a:pPr>
+            <a:endParaRPr lang="en-US" b="0" dirty="0">
+              <a:solidFill>
+                <a:srgbClr val="335B74"/>
+              </a:solidFill>
+              <a:effectLst/>
+              <a:latin typeface="Söhne"/>
+            </a:endParaRPr>
+          </a:p>
+          <a:p>
+            <a:pPr marL="285750" indent="-285750" algn="just">
+              <a:buClr>
+                <a:srgbClr val="335B74"/>
+              </a:buClr>
+              <a:buFont typeface="Arial" panose="020B0604020202020204" pitchFamily="34" charset="0"/>
+              <a:buChar char="•"/>
+            </a:pPr>
+            <a:r>
+              <a:rPr lang="en-US" b="0" dirty="0">
+                <a:solidFill>
+                  <a:srgbClr val="335B74"/>
+                </a:solidFill>
+                <a:effectLst/>
+                <a:latin typeface="Söhne"/>
+              </a:rPr>
+              <a:t>This information was compiled circa 1997 and it pertains to the Czech Republic.</a:t>
+            </a:r>
+          </a:p>
+          <a:p>
+            <a:pPr marL="285750" indent="-285750" algn="just">
+              <a:buClr>
+                <a:srgbClr val="335B74"/>
+              </a:buClr>
+              <a:buFont typeface="Arial" panose="020B0604020202020204" pitchFamily="34" charset="0"/>
+              <a:buChar char="•"/>
+            </a:pPr>
+            <a:endParaRPr lang="en-US" b="0" dirty="0">
+              <a:solidFill>
+                <a:srgbClr val="335B74"/>
+              </a:solidFill>
+              <a:effectLst/>
+              <a:latin typeface="Söhne"/>
+            </a:endParaRPr>
+          </a:p>
+          <a:p>
+            <a:pPr marL="285750" indent="-285750" algn="just">
+              <a:buClr>
+                <a:srgbClr val="335B74"/>
+              </a:buClr>
+              <a:buFont typeface="Arial" panose="020B0604020202020204" pitchFamily="34" charset="0"/>
+              <a:buChar char="•"/>
+            </a:pPr>
+            <a:r>
+              <a:rPr lang="en-US" b="0" dirty="0">
+                <a:solidFill>
+                  <a:srgbClr val="335B74"/>
+                </a:solidFill>
+                <a:effectLst/>
+                <a:latin typeface="Söhne"/>
+              </a:rPr>
+              <a:t>It contains information about a bank’s client base, their respective bank account, cards, transactions and loans that can either be completed successfully or with issues.</a:t>
+            </a:r>
+          </a:p>
+          <a:p>
+            <a:pPr marL="285750" indent="-285750" algn="just">
+              <a:buClr>
+                <a:srgbClr val="335B74"/>
+              </a:buClr>
+              <a:buFont typeface="Arial" panose="020B0604020202020204" pitchFamily="34" charset="0"/>
+              <a:buChar char="•"/>
+            </a:pPr>
+            <a:endParaRPr lang="en-US" b="0" dirty="0">
+              <a:solidFill>
+                <a:srgbClr val="335B74"/>
+              </a:solidFill>
+              <a:effectLst/>
+              <a:latin typeface="Söhne"/>
+            </a:endParaRPr>
+          </a:p>
+          <a:p>
+            <a:pPr marL="285750" indent="-285750" algn="just">
+              <a:buClr>
+                <a:srgbClr val="335B74"/>
+              </a:buClr>
+              <a:buFont typeface="Arial" panose="020B0604020202020204" pitchFamily="34" charset="0"/>
+              <a:buChar char="•"/>
+            </a:pPr>
+            <a:r>
+              <a:rPr lang="en-US" b="0" dirty="0">
+                <a:solidFill>
+                  <a:srgbClr val="335B74"/>
+                </a:solidFill>
+                <a:effectLst/>
+                <a:latin typeface="Söhne"/>
+              </a:rPr>
+              <a:t>It also contains some demographic information such as age, gender and general district information.</a:t>
+            </a:r>
+          </a:p>
+        </p:txBody>
+      </p:sp>
+      <p:sp>
+        <p:nvSpPr>
+          <p:cNvPr id="4" name="Google Shape;434;p52">
+            <a:extLst>
+              <a:ext uri="{FF2B5EF4-FFF2-40B4-BE49-F238E27FC236}">
+                <a16:creationId xmlns:a16="http://schemas.microsoft.com/office/drawing/2014/main" id="{C2E8DD63-32BB-1945-9EA8-78A7A56DC74A}"/>
               </a:ext>
             </a:extLst>
           </p:cNvPr>
@@ -28374,7 +28300,7 @@
     </p:spTree>
     <p:extLst>
       <p:ext uri="{BB962C8B-B14F-4D97-AF65-F5344CB8AC3E}">
-        <p14:creationId xmlns:p14="http://schemas.microsoft.com/office/powerpoint/2010/main" val="3722826799"/>
+        <p14:creationId xmlns:p14="http://schemas.microsoft.com/office/powerpoint/2010/main" val="3350712440"/>
       </p:ext>
     </p:extLst>
   </p:cSld>
@@ -28384,7 +28310,7 @@
 </p:sld>
 </file>
 
-<file path=ppt/slides/slide5.xml><?xml version="1.0" encoding="utf-8"?>
+<file path=ppt/slides/slide4.xml><?xml version="1.0" encoding="utf-8"?>
 <p:sld xmlns:a="http://schemas.openxmlformats.org/drawingml/2006/main" xmlns:r="http://schemas.openxmlformats.org/officeDocument/2006/relationships" xmlns:p="http://schemas.openxmlformats.org/presentationml/2006/main">
   <p:cSld>
     <p:spTree>
@@ -28436,10 +28362,93 @@
       </p:sp>
       <p:sp>
         <p:nvSpPr>
-          <p:cNvPr id="3" name="Google Shape;434;p52">
+          <p:cNvPr id="3" name="TextBox 2">
             <a:extLst>
               <a:ext uri="{FF2B5EF4-FFF2-40B4-BE49-F238E27FC236}">
-                <a16:creationId xmlns:a16="http://schemas.microsoft.com/office/drawing/2014/main" id="{523B5CC9-5911-39D6-6A7B-48990E106D9E}"/>
+                <a16:creationId xmlns:a16="http://schemas.microsoft.com/office/drawing/2014/main" id="{301DBBFF-0235-0A37-44DC-2796408B1FEB}"/>
+              </a:ext>
+            </a:extLst>
+          </p:cNvPr>
+          <p:cNvSpPr txBox="1"/>
+          <p:nvPr/>
+        </p:nvSpPr>
+        <p:spPr>
+          <a:xfrm>
+            <a:off x="720000" y="1378527"/>
+            <a:ext cx="7329491" cy="1384995"/>
+          </a:xfrm>
+          <a:prstGeom prst="rect">
+            <a:avLst/>
+          </a:prstGeom>
+          <a:noFill/>
+        </p:spPr>
+        <p:txBody>
+          <a:bodyPr wrap="square" rtlCol="0">
+            <a:spAutoFit/>
+          </a:bodyPr>
+          <a:lstStyle/>
+          <a:p>
+            <a:pPr marL="285750" indent="-285750" algn="just">
+              <a:buClr>
+                <a:srgbClr val="335B74"/>
+              </a:buClr>
+              <a:buFont typeface="Arial" panose="020B0604020202020204" pitchFamily="34" charset="0"/>
+              <a:buChar char="•"/>
+            </a:pPr>
+            <a:r>
+              <a:rPr lang="en-US" b="0" dirty="0">
+                <a:solidFill>
+                  <a:srgbClr val="335B74"/>
+                </a:solidFill>
+                <a:effectLst/>
+                <a:latin typeface="Söhne"/>
+              </a:rPr>
+              <a:t>The dataset can be fairly vast in some aspects as it has almost 400 000 entries on the transactions table, related to over 5000 clients.</a:t>
+            </a:r>
+          </a:p>
+          <a:p>
+            <a:pPr marL="285750" indent="-285750" algn="just">
+              <a:buClr>
+                <a:srgbClr val="335B74"/>
+              </a:buClr>
+              <a:buFont typeface="Arial" panose="020B0604020202020204" pitchFamily="34" charset="0"/>
+              <a:buChar char="•"/>
+            </a:pPr>
+            <a:endParaRPr lang="en-US" b="0" dirty="0">
+              <a:solidFill>
+                <a:srgbClr val="335B74"/>
+              </a:solidFill>
+              <a:effectLst/>
+              <a:latin typeface="Söhne"/>
+            </a:endParaRPr>
+          </a:p>
+          <a:p>
+            <a:pPr marL="285750" indent="-285750" algn="just">
+              <a:buClr>
+                <a:srgbClr val="335B74"/>
+              </a:buClr>
+              <a:buFont typeface="Arial" panose="020B0604020202020204" pitchFamily="34" charset="0"/>
+              <a:buChar char="•"/>
+            </a:pPr>
+            <a:r>
+              <a:rPr lang="en-US" b="0" dirty="0">
+                <a:solidFill>
+                  <a:srgbClr val="335B74"/>
+                </a:solidFill>
+                <a:effectLst/>
+                <a:latin typeface="Söhne"/>
+              </a:rPr>
+              <a:t>On the other hand, and this might be problematic for the future predictive modeling task, it contains information on only just over 300 loans with under 50(!) of these being of the “bad” class…</a:t>
+            </a:r>
+          </a:p>
+        </p:txBody>
+      </p:sp>
+      <p:sp>
+        <p:nvSpPr>
+          <p:cNvPr id="4" name="Google Shape;434;p52">
+            <a:extLst>
+              <a:ext uri="{FF2B5EF4-FFF2-40B4-BE49-F238E27FC236}">
+                <a16:creationId xmlns:a16="http://schemas.microsoft.com/office/drawing/2014/main" id="{C2E8DD63-32BB-1945-9EA8-78A7A56DC74A}"/>
               </a:ext>
             </a:extLst>
           </p:cNvPr>
@@ -28533,7 +28542,7 @@
     </p:spTree>
     <p:extLst>
       <p:ext uri="{BB962C8B-B14F-4D97-AF65-F5344CB8AC3E}">
-        <p14:creationId xmlns:p14="http://schemas.microsoft.com/office/powerpoint/2010/main" val="2955541333"/>
+        <p14:creationId xmlns:p14="http://schemas.microsoft.com/office/powerpoint/2010/main" val="3561850260"/>
       </p:ext>
     </p:extLst>
   </p:cSld>
@@ -28543,7 +28552,7 @@
 </p:sld>
 </file>
 
-<file path=ppt/slides/slide6.xml><?xml version="1.0" encoding="utf-8"?>
+<file path=ppt/slides/slide5.xml><?xml version="1.0" encoding="utf-8"?>
 <p:sld xmlns:a="http://schemas.openxmlformats.org/drawingml/2006/main" xmlns:r="http://schemas.openxmlformats.org/officeDocument/2006/relationships" xmlns:p="http://schemas.openxmlformats.org/presentationml/2006/main">
   <p:cSld>
     <p:spTree>
@@ -28595,10 +28604,319 @@
       </p:sp>
       <p:sp>
         <p:nvSpPr>
-          <p:cNvPr id="3" name="Google Shape;434;p52">
+          <p:cNvPr id="3" name="TextBox 2">
             <a:extLst>
               <a:ext uri="{FF2B5EF4-FFF2-40B4-BE49-F238E27FC236}">
-                <a16:creationId xmlns:a16="http://schemas.microsoft.com/office/drawing/2014/main" id="{DAC39E70-6F2A-73FE-326F-B3B95CA3A9AC}"/>
+                <a16:creationId xmlns:a16="http://schemas.microsoft.com/office/drawing/2014/main" id="{301DBBFF-0235-0A37-44DC-2796408B1FEB}"/>
+              </a:ext>
+            </a:extLst>
+          </p:cNvPr>
+          <p:cNvSpPr txBox="1"/>
+          <p:nvPr/>
+        </p:nvSpPr>
+        <p:spPr>
+          <a:xfrm>
+            <a:off x="720000" y="1378527"/>
+            <a:ext cx="7329491" cy="3816429"/>
+          </a:xfrm>
+          <a:prstGeom prst="rect">
+            <a:avLst/>
+          </a:prstGeom>
+          <a:noFill/>
+        </p:spPr>
+        <p:txBody>
+          <a:bodyPr wrap="square" rtlCol="0">
+            <a:spAutoFit/>
+          </a:bodyPr>
+          <a:lstStyle/>
+          <a:p>
+            <a:pPr marL="285750" indent="-285750" algn="just">
+              <a:buClr>
+                <a:srgbClr val="335B74"/>
+              </a:buClr>
+              <a:buFont typeface="Arial" panose="020B0604020202020204" pitchFamily="34" charset="0"/>
+              <a:buChar char="•"/>
+            </a:pPr>
+            <a:r>
+              <a:rPr lang="en-US" b="0" dirty="0">
+                <a:solidFill>
+                  <a:srgbClr val="335B74"/>
+                </a:solidFill>
+                <a:effectLst/>
+                <a:latin typeface="Söhne"/>
+              </a:rPr>
+              <a:t>Data understanding is another vital step, as it ensures data quality and suitability for machine learning algorithms.</a:t>
+            </a:r>
+          </a:p>
+          <a:p>
+            <a:pPr marL="285750" indent="-285750" algn="just">
+              <a:buClr>
+                <a:srgbClr val="335B74"/>
+              </a:buClr>
+              <a:buFont typeface="Arial" panose="020B0604020202020204" pitchFamily="34" charset="0"/>
+              <a:buChar char="•"/>
+            </a:pPr>
+            <a:endParaRPr lang="en-US" b="0" dirty="0">
+              <a:solidFill>
+                <a:srgbClr val="335B74"/>
+              </a:solidFill>
+              <a:effectLst/>
+              <a:latin typeface="Söhne"/>
+            </a:endParaRPr>
+          </a:p>
+          <a:p>
+            <a:pPr marL="285750" indent="-285750" algn="just">
+              <a:buClr>
+                <a:srgbClr val="335B74"/>
+              </a:buClr>
+              <a:buFont typeface="Arial" panose="020B0604020202020204" pitchFamily="34" charset="0"/>
+              <a:buChar char="•"/>
+            </a:pPr>
+            <a:r>
+              <a:rPr lang="en-US" b="0" dirty="0">
+                <a:solidFill>
+                  <a:srgbClr val="335B74"/>
+                </a:solidFill>
+                <a:effectLst/>
+                <a:latin typeface="Söhne"/>
+              </a:rPr>
+              <a:t>To start off, the age and gender fields are fused as just one entry, so to make it more suitable, we separated them into their respective fields and one-hot encoded the gender field.</a:t>
+            </a:r>
+          </a:p>
+          <a:p>
+            <a:pPr marL="285750" indent="-285750" algn="just">
+              <a:buClr>
+                <a:srgbClr val="335B74"/>
+              </a:buClr>
+              <a:buFont typeface="Arial" panose="020B0604020202020204" pitchFamily="34" charset="0"/>
+              <a:buChar char="•"/>
+            </a:pPr>
+            <a:endParaRPr lang="en-US" b="0" dirty="0">
+              <a:solidFill>
+                <a:srgbClr val="335B74"/>
+              </a:solidFill>
+              <a:effectLst/>
+              <a:latin typeface="Söhne"/>
+            </a:endParaRPr>
+          </a:p>
+          <a:p>
+            <a:pPr marL="285750" indent="-285750" algn="just">
+              <a:buClr>
+                <a:srgbClr val="335B74"/>
+              </a:buClr>
+              <a:buFont typeface="Arial" panose="020B0604020202020204" pitchFamily="34" charset="0"/>
+              <a:buChar char="•"/>
+            </a:pPr>
+            <a:r>
+              <a:rPr lang="en-US" b="0" dirty="0">
+                <a:solidFill>
+                  <a:srgbClr val="335B74"/>
+                </a:solidFill>
+                <a:effectLst/>
+                <a:latin typeface="Söhne"/>
+              </a:rPr>
+              <a:t>In the demographic data, we there was missing data on one specific district regarding unemployment rate and committed crimes, both year 1995.</a:t>
+            </a:r>
+          </a:p>
+          <a:p>
+            <a:pPr marL="285750" indent="-285750" algn="just">
+              <a:buClr>
+                <a:srgbClr val="335B74"/>
+              </a:buClr>
+              <a:buFont typeface="Arial" panose="020B0604020202020204" pitchFamily="34" charset="0"/>
+              <a:buChar char="•"/>
+            </a:pPr>
+            <a:endParaRPr lang="en-US" b="0" dirty="0">
+              <a:solidFill>
+                <a:srgbClr val="335B74"/>
+              </a:solidFill>
+              <a:effectLst/>
+              <a:latin typeface="Söhne"/>
+            </a:endParaRPr>
+          </a:p>
+          <a:p>
+            <a:pPr marL="285750" indent="-285750" algn="just">
+              <a:buClr>
+                <a:srgbClr val="335B74"/>
+              </a:buClr>
+              <a:buFont typeface="Arial" panose="020B0604020202020204" pitchFamily="34" charset="0"/>
+              <a:buChar char="•"/>
+            </a:pPr>
+            <a:r>
+              <a:rPr lang="en-US" b="0" dirty="0">
+                <a:solidFill>
+                  <a:srgbClr val="335B74"/>
+                </a:solidFill>
+                <a:effectLst/>
+                <a:latin typeface="Söhne"/>
+              </a:rPr>
+              <a:t>We addressed this by mean imputation.</a:t>
+            </a:r>
+          </a:p>
+          <a:p>
+            <a:pPr marL="285750" indent="-285750" algn="just">
+              <a:buClr>
+                <a:srgbClr val="335B74"/>
+              </a:buClr>
+              <a:buFont typeface="Arial" panose="020B0604020202020204" pitchFamily="34" charset="0"/>
+              <a:buChar char="•"/>
+            </a:pPr>
+            <a:endParaRPr lang="en-US" b="0" dirty="0">
+              <a:solidFill>
+                <a:srgbClr val="335B74"/>
+              </a:solidFill>
+              <a:effectLst/>
+              <a:latin typeface="Söhne"/>
+            </a:endParaRPr>
+          </a:p>
+          <a:p>
+            <a:pPr marL="285750" indent="-285750" algn="just">
+              <a:buClr>
+                <a:srgbClr val="335B74"/>
+              </a:buClr>
+              <a:buFont typeface="Arial" panose="020B0604020202020204" pitchFamily="34" charset="0"/>
+              <a:buChar char="•"/>
+            </a:pPr>
+            <a:r>
+              <a:rPr lang="en-US" b="0" dirty="0">
+                <a:solidFill>
+                  <a:srgbClr val="335B74"/>
+                </a:solidFill>
+                <a:effectLst/>
+                <a:latin typeface="Söhne"/>
+              </a:rPr>
+              <a:t>Also, regarding demographic data, we performed some feature engineering that might be useful later and created the following columns:</a:t>
+            </a:r>
+          </a:p>
+          <a:p>
+            <a:pPr algn="just">
+              <a:buClr>
+                <a:srgbClr val="335B74"/>
+              </a:buClr>
+            </a:pPr>
+            <a:r>
+              <a:rPr lang="en-US" sz="1200" b="0" dirty="0">
+                <a:solidFill>
+                  <a:srgbClr val="335B74"/>
+                </a:solidFill>
+                <a:effectLst/>
+                <a:latin typeface="Söhne"/>
+              </a:rPr>
+              <a:t>	- Unemployment Growth</a:t>
+            </a:r>
+          </a:p>
+          <a:p>
+            <a:pPr algn="just">
+              <a:buClr>
+                <a:srgbClr val="335B74"/>
+              </a:buClr>
+            </a:pPr>
+            <a:r>
+              <a:rPr lang="en-US" sz="1200" dirty="0">
+                <a:solidFill>
+                  <a:srgbClr val="335B74"/>
+                </a:solidFill>
+                <a:latin typeface="Söhne"/>
+              </a:rPr>
+              <a:t>	</a:t>
+            </a:r>
+            <a:r>
+              <a:rPr lang="en-US" sz="1200" b="0" dirty="0">
+                <a:solidFill>
+                  <a:srgbClr val="335B74"/>
+                </a:solidFill>
+                <a:effectLst/>
+                <a:latin typeface="Söhne"/>
+              </a:rPr>
+              <a:t>- Committed Crimes Growth</a:t>
+            </a:r>
+          </a:p>
+          <a:p>
+            <a:pPr algn="just">
+              <a:buClr>
+                <a:srgbClr val="335B74"/>
+              </a:buClr>
+            </a:pPr>
+            <a:r>
+              <a:rPr lang="en-US" sz="1200" dirty="0">
+                <a:solidFill>
+                  <a:srgbClr val="335B74"/>
+                </a:solidFill>
+                <a:latin typeface="Söhne"/>
+              </a:rPr>
+              <a:t>	</a:t>
+            </a:r>
+            <a:r>
+              <a:rPr lang="en-US" sz="1200" b="0" dirty="0">
+                <a:solidFill>
+                  <a:srgbClr val="335B74"/>
+                </a:solidFill>
+                <a:effectLst/>
+                <a:latin typeface="Söhne"/>
+              </a:rPr>
+              <a:t>- Crime Rate</a:t>
+            </a:r>
+          </a:p>
+          <a:p>
+            <a:pPr algn="just">
+              <a:buClr>
+                <a:srgbClr val="335B74"/>
+              </a:buClr>
+            </a:pPr>
+            <a:r>
+              <a:rPr lang="en-US" sz="1200" dirty="0">
+                <a:solidFill>
+                  <a:srgbClr val="335B74"/>
+                </a:solidFill>
+                <a:latin typeface="Söhne"/>
+              </a:rPr>
+              <a:t>	</a:t>
+            </a:r>
+            <a:r>
+              <a:rPr lang="en-US" sz="1200" b="0" dirty="0">
+                <a:solidFill>
+                  <a:srgbClr val="335B74"/>
+                </a:solidFill>
+                <a:effectLst/>
+                <a:latin typeface="Söhne"/>
+              </a:rPr>
+              <a:t>- Entrepreneurs Percentage</a:t>
+            </a:r>
+          </a:p>
+          <a:p>
+            <a:pPr algn="just">
+              <a:buClr>
+                <a:srgbClr val="335B74"/>
+              </a:buClr>
+            </a:pPr>
+            <a:r>
+              <a:rPr lang="en-US" sz="1200" dirty="0">
+                <a:solidFill>
+                  <a:srgbClr val="335B74"/>
+                </a:solidFill>
+                <a:latin typeface="Söhne"/>
+              </a:rPr>
+              <a:t>	</a:t>
+            </a:r>
+            <a:r>
+              <a:rPr lang="en-US" sz="1200" b="0" dirty="0">
+                <a:solidFill>
+                  <a:srgbClr val="335B74"/>
+                </a:solidFill>
+                <a:effectLst/>
+                <a:latin typeface="Söhne"/>
+              </a:rPr>
+              <a:t>- Urban Population Density</a:t>
+            </a:r>
+          </a:p>
+        </p:txBody>
+      </p:sp>
+      <p:sp>
+        <p:nvSpPr>
+          <p:cNvPr id="4" name="Google Shape;434;p52">
+            <a:extLst>
+              <a:ext uri="{FF2B5EF4-FFF2-40B4-BE49-F238E27FC236}">
+                <a16:creationId xmlns:a16="http://schemas.microsoft.com/office/drawing/2014/main" id="{C2E8DD63-32BB-1945-9EA8-78A7A56DC74A}"/>
               </a:ext>
             </a:extLst>
           </p:cNvPr>
@@ -28692,7 +29010,7 @@
     </p:spTree>
     <p:extLst>
       <p:ext uri="{BB962C8B-B14F-4D97-AF65-F5344CB8AC3E}">
-        <p14:creationId xmlns:p14="http://schemas.microsoft.com/office/powerpoint/2010/main" val="1958071718"/>
+        <p14:creationId xmlns:p14="http://schemas.microsoft.com/office/powerpoint/2010/main" val="3822018359"/>
       </p:ext>
     </p:extLst>
   </p:cSld>
@@ -28702,7 +29020,7 @@
 </p:sld>
 </file>
 
-<file path=ppt/slides/slide7.xml><?xml version="1.0" encoding="utf-8"?>
+<file path=ppt/slides/slide6.xml><?xml version="1.0" encoding="utf-8"?>
 <p:sld xmlns:a="http://schemas.openxmlformats.org/drawingml/2006/main" xmlns:r="http://schemas.openxmlformats.org/officeDocument/2006/relationships" xmlns:p="http://schemas.openxmlformats.org/presentationml/2006/main">
   <p:cSld>
     <p:spTree>
@@ -28754,10 +29072,236 @@
       </p:sp>
       <p:sp>
         <p:nvSpPr>
-          <p:cNvPr id="3" name="Google Shape;434;p52">
+          <p:cNvPr id="3" name="TextBox 2">
             <a:extLst>
               <a:ext uri="{FF2B5EF4-FFF2-40B4-BE49-F238E27FC236}">
-                <a16:creationId xmlns:a16="http://schemas.microsoft.com/office/drawing/2014/main" id="{F7F97D9E-A3EF-8809-C6FD-E405FA0761E1}"/>
+                <a16:creationId xmlns:a16="http://schemas.microsoft.com/office/drawing/2014/main" id="{301DBBFF-0235-0A37-44DC-2796408B1FEB}"/>
+              </a:ext>
+            </a:extLst>
+          </p:cNvPr>
+          <p:cNvSpPr txBox="1"/>
+          <p:nvPr/>
+        </p:nvSpPr>
+        <p:spPr>
+          <a:xfrm>
+            <a:off x="720000" y="1378527"/>
+            <a:ext cx="7329491" cy="4185761"/>
+          </a:xfrm>
+          <a:prstGeom prst="rect">
+            <a:avLst/>
+          </a:prstGeom>
+          <a:noFill/>
+        </p:spPr>
+        <p:txBody>
+          <a:bodyPr wrap="square" rtlCol="0">
+            <a:spAutoFit/>
+          </a:bodyPr>
+          <a:lstStyle/>
+          <a:p>
+            <a:pPr marL="285750" indent="-285750" algn="just">
+              <a:buClr>
+                <a:srgbClr val="335B74"/>
+              </a:buClr>
+              <a:buFont typeface="Arial" panose="020B0604020202020204" pitchFamily="34" charset="0"/>
+              <a:buChar char="•"/>
+            </a:pPr>
+            <a:r>
+              <a:rPr lang="en-US" b="0" dirty="0">
+                <a:solidFill>
+                  <a:srgbClr val="335B74"/>
+                </a:solidFill>
+                <a:effectLst/>
+                <a:latin typeface="Söhne"/>
+              </a:rPr>
+              <a:t>In the transactions table there were several steps that were taken.</a:t>
+            </a:r>
+          </a:p>
+          <a:p>
+            <a:pPr algn="just">
+              <a:buClr>
+                <a:srgbClr val="335B74"/>
+              </a:buClr>
+            </a:pPr>
+            <a:endParaRPr lang="en-US" b="0" dirty="0">
+              <a:solidFill>
+                <a:srgbClr val="335B74"/>
+              </a:solidFill>
+              <a:effectLst/>
+              <a:latin typeface="Söhne"/>
+            </a:endParaRPr>
+          </a:p>
+          <a:p>
+            <a:pPr marL="285750" indent="-285750" algn="just">
+              <a:buClr>
+                <a:srgbClr val="335B74"/>
+              </a:buClr>
+              <a:buFont typeface="Arial" panose="020B0604020202020204" pitchFamily="34" charset="0"/>
+              <a:buChar char="•"/>
+            </a:pPr>
+            <a:r>
+              <a:rPr lang="en-US" b="0" dirty="0">
+                <a:solidFill>
+                  <a:srgbClr val="335B74"/>
+                </a:solidFill>
+                <a:effectLst/>
+                <a:latin typeface="Söhne"/>
+              </a:rPr>
+              <a:t>To start their entries for both “withdrawal” and “withdrawal in cash” and since it’s easy to see that they were the same we renamed one to be like the other. The same happened in column “operation” and we did the same.</a:t>
+            </a:r>
+          </a:p>
+          <a:p>
+            <a:pPr marL="285750" indent="-285750" algn="just">
+              <a:buClr>
+                <a:srgbClr val="335B74"/>
+              </a:buClr>
+              <a:buFont typeface="Arial" panose="020B0604020202020204" pitchFamily="34" charset="0"/>
+              <a:buChar char="•"/>
+            </a:pPr>
+            <a:endParaRPr lang="en-US" b="0" dirty="0">
+              <a:solidFill>
+                <a:srgbClr val="335B74"/>
+              </a:solidFill>
+              <a:effectLst/>
+              <a:latin typeface="Söhne"/>
+            </a:endParaRPr>
+          </a:p>
+          <a:p>
+            <a:pPr marL="285750" indent="-285750" algn="just">
+              <a:buClr>
+                <a:srgbClr val="335B74"/>
+              </a:buClr>
+              <a:buFont typeface="Arial" panose="020B0604020202020204" pitchFamily="34" charset="0"/>
+              <a:buChar char="•"/>
+            </a:pPr>
+            <a:r>
+              <a:rPr lang="en-US" b="0" dirty="0">
+                <a:solidFill>
+                  <a:srgbClr val="335B74"/>
+                </a:solidFill>
+                <a:effectLst/>
+                <a:latin typeface="Söhne"/>
+              </a:rPr>
+              <a:t>There are  some null values in column “operation”, and we found that these always belonged to </a:t>
+            </a:r>
+            <a:r>
+              <a:rPr lang="en-US" b="0" dirty="0" err="1">
+                <a:solidFill>
+                  <a:srgbClr val="335B74"/>
+                </a:solidFill>
+                <a:effectLst/>
+                <a:latin typeface="Söhne"/>
+              </a:rPr>
+              <a:t>k_symbol</a:t>
+            </a:r>
+            <a:r>
+              <a:rPr lang="en-US" b="0" dirty="0">
+                <a:solidFill>
+                  <a:srgbClr val="335B74"/>
+                </a:solidFill>
+                <a:effectLst/>
+                <a:latin typeface="Söhne"/>
+              </a:rPr>
+              <a:t> value “interest credited” so we added “credit in cash” to these null values. There was also a </a:t>
+            </a:r>
+            <a:r>
+              <a:rPr lang="en-US" b="0" dirty="0" err="1">
+                <a:solidFill>
+                  <a:srgbClr val="335B74"/>
+                </a:solidFill>
+                <a:effectLst/>
+                <a:latin typeface="Söhne"/>
+              </a:rPr>
+              <a:t>k_symbol</a:t>
+            </a:r>
+            <a:r>
+              <a:rPr lang="en-US" b="0" dirty="0">
+                <a:solidFill>
+                  <a:srgbClr val="335B74"/>
+                </a:solidFill>
+                <a:effectLst/>
+                <a:latin typeface="Söhne"/>
+              </a:rPr>
+              <a:t> value “ ” and after looking at records with this value and it always referred to cash withdrawals, so we renamed it to “regular expense”.</a:t>
+            </a:r>
+          </a:p>
+          <a:p>
+            <a:pPr marL="285750" indent="-285750" algn="just">
+              <a:buClr>
+                <a:srgbClr val="335B74"/>
+              </a:buClr>
+              <a:buFont typeface="Arial" panose="020B0604020202020204" pitchFamily="34" charset="0"/>
+              <a:buChar char="•"/>
+            </a:pPr>
+            <a:endParaRPr lang="en-US" b="0" dirty="0">
+              <a:solidFill>
+                <a:srgbClr val="335B74"/>
+              </a:solidFill>
+              <a:effectLst/>
+              <a:latin typeface="Söhne"/>
+            </a:endParaRPr>
+          </a:p>
+          <a:p>
+            <a:pPr marL="285750" indent="-285750" algn="just">
+              <a:buClr>
+                <a:srgbClr val="335B74"/>
+              </a:buClr>
+              <a:buFont typeface="Arial" panose="020B0604020202020204" pitchFamily="34" charset="0"/>
+              <a:buChar char="•"/>
+            </a:pPr>
+            <a:r>
+              <a:rPr lang="en-US" b="0" dirty="0">
+                <a:solidFill>
+                  <a:srgbClr val="335B74"/>
+                </a:solidFill>
+                <a:effectLst/>
+                <a:latin typeface="Söhne"/>
+              </a:rPr>
+              <a:t>Furthermore, there were null values in some records on column “target bank” and these always belonged either to type “credit in cash” or “withdrawal in cash” contrary to non null ones which had “… another bank” so we can safely assume that these are all operations performed within “our” bank which we added to the target with the fake name “DJ”.</a:t>
+            </a:r>
+          </a:p>
+          <a:p>
+            <a:pPr marL="285750" indent="-285750" algn="just">
+              <a:buClr>
+                <a:srgbClr val="335B74"/>
+              </a:buClr>
+              <a:buFont typeface="Arial" panose="020B0604020202020204" pitchFamily="34" charset="0"/>
+              <a:buChar char="•"/>
+            </a:pPr>
+            <a:endParaRPr lang="en-US" b="0" dirty="0">
+              <a:solidFill>
+                <a:srgbClr val="335B74"/>
+              </a:solidFill>
+              <a:effectLst/>
+              <a:latin typeface="Söhne"/>
+            </a:endParaRPr>
+          </a:p>
+          <a:p>
+            <a:pPr marL="285750" indent="-285750" algn="just">
+              <a:buClr>
+                <a:srgbClr val="335B74"/>
+              </a:buClr>
+              <a:buFont typeface="Arial" panose="020B0604020202020204" pitchFamily="34" charset="0"/>
+              <a:buChar char="•"/>
+            </a:pPr>
+            <a:r>
+              <a:rPr lang="en-US" b="0" dirty="0">
+                <a:solidFill>
+                  <a:srgbClr val="335B74"/>
+                </a:solidFill>
+                <a:effectLst/>
+                <a:latin typeface="Söhne"/>
+              </a:rPr>
+              <a:t>Finally, there were transactions with no target account, all of which belonged to the type “withdrawal” which makes sense since contrary to all other operations these only involve one account. We added the own account id to these. </a:t>
+            </a:r>
+          </a:p>
+        </p:txBody>
+      </p:sp>
+      <p:sp>
+        <p:nvSpPr>
+          <p:cNvPr id="4" name="Google Shape;434;p52">
+            <a:extLst>
+              <a:ext uri="{FF2B5EF4-FFF2-40B4-BE49-F238E27FC236}">
+                <a16:creationId xmlns:a16="http://schemas.microsoft.com/office/drawing/2014/main" id="{C2E8DD63-32BB-1945-9EA8-78A7A56DC74A}"/>
               </a:ext>
             </a:extLst>
           </p:cNvPr>
@@ -28851,7 +29395,446 @@
     </p:spTree>
     <p:extLst>
       <p:ext uri="{BB962C8B-B14F-4D97-AF65-F5344CB8AC3E}">
-        <p14:creationId xmlns:p14="http://schemas.microsoft.com/office/powerpoint/2010/main" val="4034351687"/>
+        <p14:creationId xmlns:p14="http://schemas.microsoft.com/office/powerpoint/2010/main" val="897869340"/>
+      </p:ext>
+    </p:extLst>
+  </p:cSld>
+  <p:clrMapOvr>
+    <a:masterClrMapping/>
+  </p:clrMapOvr>
+</p:sld>
+</file>
+
+<file path=ppt/slides/slide7.xml><?xml version="1.0" encoding="utf-8"?>
+<p:sld xmlns:a="http://schemas.openxmlformats.org/drawingml/2006/main" xmlns:r="http://schemas.openxmlformats.org/officeDocument/2006/relationships" xmlns:p="http://schemas.openxmlformats.org/presentationml/2006/main">
+  <p:cSld>
+    <p:spTree>
+      <p:nvGrpSpPr>
+        <p:cNvPr id="1" name=""/>
+        <p:cNvGrpSpPr/>
+        <p:nvPr/>
+      </p:nvGrpSpPr>
+      <p:grpSpPr>
+        <a:xfrm>
+          <a:off x="0" y="0"/>
+          <a:ext cx="0" cy="0"/>
+          <a:chOff x="0" y="0"/>
+          <a:chExt cx="0" cy="0"/>
+        </a:xfrm>
+      </p:grpSpPr>
+      <p:sp>
+        <p:nvSpPr>
+          <p:cNvPr id="14" name="Title 13">
+            <a:extLst>
+              <a:ext uri="{FF2B5EF4-FFF2-40B4-BE49-F238E27FC236}">
+                <a16:creationId xmlns:a16="http://schemas.microsoft.com/office/drawing/2014/main" id="{CC84196D-2419-473F-B767-04FB276E2EFD}"/>
+              </a:ext>
+            </a:extLst>
+          </p:cNvPr>
+          <p:cNvSpPr>
+            <a:spLocks noGrp="1"/>
+          </p:cNvSpPr>
+          <p:nvPr>
+            <p:ph type="title" idx="15"/>
+          </p:nvPr>
+        </p:nvSpPr>
+        <p:spPr/>
+        <p:txBody>
+          <a:bodyPr/>
+          <a:lstStyle/>
+          <a:p>
+            <a:r>
+              <a:rPr lang="pt-PT" sz="2800" dirty="0" err="1"/>
+              <a:t>Descriptive</a:t>
+            </a:r>
+            <a:r>
+              <a:rPr lang="pt-PT" sz="2800" dirty="0"/>
+              <a:t> </a:t>
+            </a:r>
+            <a:r>
+              <a:rPr lang="pt-PT" sz="2800" dirty="0" err="1"/>
+              <a:t>Modelling</a:t>
+            </a:r>
+            <a:endParaRPr lang="pt-PT" sz="2800" dirty="0"/>
+          </a:p>
+        </p:txBody>
+      </p:sp>
+      <p:sp>
+        <p:nvSpPr>
+          <p:cNvPr id="3" name="TextBox 2">
+            <a:extLst>
+              <a:ext uri="{FF2B5EF4-FFF2-40B4-BE49-F238E27FC236}">
+                <a16:creationId xmlns:a16="http://schemas.microsoft.com/office/drawing/2014/main" id="{301DBBFF-0235-0A37-44DC-2796408B1FEB}"/>
+              </a:ext>
+            </a:extLst>
+          </p:cNvPr>
+          <p:cNvSpPr txBox="1"/>
+          <p:nvPr/>
+        </p:nvSpPr>
+        <p:spPr>
+          <a:xfrm>
+            <a:off x="720000" y="1378527"/>
+            <a:ext cx="7329491" cy="1600438"/>
+          </a:xfrm>
+          <a:prstGeom prst="rect">
+            <a:avLst/>
+          </a:prstGeom>
+          <a:noFill/>
+        </p:spPr>
+        <p:txBody>
+          <a:bodyPr wrap="square" rtlCol="0">
+            <a:spAutoFit/>
+          </a:bodyPr>
+          <a:lstStyle/>
+          <a:p>
+            <a:pPr marL="285750" indent="-285750" algn="just">
+              <a:buClr>
+                <a:srgbClr val="335B74"/>
+              </a:buClr>
+              <a:buFont typeface="Arial" panose="020B0604020202020204" pitchFamily="34" charset="0"/>
+              <a:buChar char="•"/>
+            </a:pPr>
+            <a:r>
+              <a:rPr lang="en-US" b="0" dirty="0">
+                <a:solidFill>
+                  <a:srgbClr val="335B74"/>
+                </a:solidFill>
+                <a:effectLst/>
+                <a:latin typeface="Söhne"/>
+              </a:rPr>
+              <a:t>To find the best </a:t>
+            </a:r>
+            <a:r>
+              <a:rPr lang="en-US" b="0" dirty="0" err="1">
+                <a:solidFill>
+                  <a:srgbClr val="335B74"/>
+                </a:solidFill>
+                <a:effectLst/>
+                <a:latin typeface="Söhne"/>
+              </a:rPr>
+              <a:t>similiarities</a:t>
+            </a:r>
+            <a:r>
+              <a:rPr lang="en-US" b="0" dirty="0">
+                <a:solidFill>
+                  <a:srgbClr val="335B74"/>
+                </a:solidFill>
+                <a:effectLst/>
+                <a:latin typeface="Söhne"/>
+              </a:rPr>
+              <a:t> between regions, we decided to use the dataset “district” as our </a:t>
+            </a:r>
+            <a:r>
+              <a:rPr lang="en-US" b="0" dirty="0" err="1">
+                <a:solidFill>
+                  <a:srgbClr val="335B74"/>
+                </a:solidFill>
+                <a:effectLst/>
+                <a:latin typeface="Söhne"/>
+              </a:rPr>
+              <a:t>dataframe</a:t>
+            </a:r>
+            <a:r>
+              <a:rPr lang="en-US" b="0" dirty="0">
+                <a:solidFill>
+                  <a:srgbClr val="335B74"/>
+                </a:solidFill>
+                <a:effectLst/>
+                <a:latin typeface="Söhne"/>
+              </a:rPr>
+              <a:t>. We also created 3 </a:t>
+            </a:r>
+            <a:r>
+              <a:rPr lang="en-US" b="0" dirty="0" err="1">
+                <a:solidFill>
+                  <a:srgbClr val="335B74"/>
+                </a:solidFill>
+                <a:effectLst/>
+                <a:latin typeface="Söhne"/>
+              </a:rPr>
+              <a:t>diferente</a:t>
+            </a:r>
+            <a:r>
+              <a:rPr lang="en-US" b="0" dirty="0">
+                <a:solidFill>
+                  <a:srgbClr val="335B74"/>
+                </a:solidFill>
+                <a:effectLst/>
+                <a:latin typeface="Söhne"/>
+              </a:rPr>
+              <a:t> cases to find those </a:t>
+            </a:r>
+            <a:r>
+              <a:rPr lang="en-US" b="0" dirty="0" err="1">
+                <a:solidFill>
+                  <a:srgbClr val="335B74"/>
+                </a:solidFill>
+                <a:effectLst/>
+                <a:latin typeface="Söhne"/>
+              </a:rPr>
+              <a:t>similiarities</a:t>
+            </a:r>
+            <a:r>
+              <a:rPr lang="en-US" b="0" dirty="0">
+                <a:solidFill>
+                  <a:srgbClr val="335B74"/>
+                </a:solidFill>
+                <a:effectLst/>
+                <a:latin typeface="Söhne"/>
+              </a:rPr>
+              <a:t>. These cases are: Economic Factors, Crime Rate Factors and Demographic Factors.</a:t>
+            </a:r>
+          </a:p>
+          <a:p>
+            <a:pPr marL="285750" indent="-285750" algn="just">
+              <a:buClr>
+                <a:srgbClr val="335B74"/>
+              </a:buClr>
+              <a:buFont typeface="Arial" panose="020B0604020202020204" pitchFamily="34" charset="0"/>
+              <a:buChar char="•"/>
+            </a:pPr>
+            <a:r>
+              <a:rPr lang="en-US" b="0" dirty="0">
+                <a:solidFill>
+                  <a:srgbClr val="335B74"/>
+                </a:solidFill>
+                <a:effectLst/>
+                <a:latin typeface="Söhne"/>
+              </a:rPr>
+              <a:t>K-means clustering was the algorithm we used because of its efficiency at finding </a:t>
+            </a:r>
+            <a:r>
+              <a:rPr lang="en-US" b="0" dirty="0" err="1">
+                <a:solidFill>
+                  <a:srgbClr val="335B74"/>
+                </a:solidFill>
+                <a:effectLst/>
+                <a:latin typeface="Söhne"/>
+              </a:rPr>
+              <a:t>similiarities</a:t>
+            </a:r>
+            <a:r>
+              <a:rPr lang="en-US" b="0" dirty="0">
+                <a:solidFill>
+                  <a:srgbClr val="335B74"/>
+                </a:solidFill>
+                <a:effectLst/>
+                <a:latin typeface="Söhne"/>
+              </a:rPr>
+              <a:t> and creating groups based on that efficiency.</a:t>
+            </a:r>
+          </a:p>
+          <a:p>
+            <a:pPr marL="285750" indent="-285750" algn="just">
+              <a:buClr>
+                <a:srgbClr val="335B74"/>
+              </a:buClr>
+              <a:buFont typeface="Arial" panose="020B0604020202020204" pitchFamily="34" charset="0"/>
+              <a:buChar char="•"/>
+            </a:pPr>
+            <a:r>
+              <a:rPr lang="en-US" b="0" dirty="0">
+                <a:solidFill>
+                  <a:srgbClr val="335B74"/>
+                </a:solidFill>
+                <a:effectLst/>
+                <a:latin typeface="Söhne"/>
+              </a:rPr>
+              <a:t>To find the optimal number of clusters for each case, we used the elbow method. The optimal number in each case was 5.</a:t>
+            </a:r>
+          </a:p>
+        </p:txBody>
+      </p:sp>
+      <p:sp>
+        <p:nvSpPr>
+          <p:cNvPr id="4" name="Google Shape;434;p52">
+            <a:extLst>
+              <a:ext uri="{FF2B5EF4-FFF2-40B4-BE49-F238E27FC236}">
+                <a16:creationId xmlns:a16="http://schemas.microsoft.com/office/drawing/2014/main" id="{C2E8DD63-32BB-1945-9EA8-78A7A56DC74A}"/>
+              </a:ext>
+            </a:extLst>
+          </p:cNvPr>
+          <p:cNvSpPr/>
+          <p:nvPr/>
+        </p:nvSpPr>
+        <p:spPr>
+          <a:xfrm flipH="1">
+            <a:off x="8310713" y="4424516"/>
+            <a:ext cx="1401099" cy="1253612"/>
+          </a:xfrm>
+          <a:custGeom>
+            <a:avLst/>
+            <a:gdLst/>
+            <a:ahLst/>
+            <a:cxnLst/>
+            <a:rect l="l" t="t" r="r" b="b"/>
+            <a:pathLst>
+              <a:path w="11409" h="11443" extrusionOk="0">
+                <a:moveTo>
+                  <a:pt x="5705" y="1"/>
+                </a:moveTo>
+                <a:cubicBezTo>
+                  <a:pt x="2569" y="1"/>
+                  <a:pt x="1" y="2569"/>
+                  <a:pt x="1" y="5738"/>
+                </a:cubicBezTo>
+                <a:cubicBezTo>
+                  <a:pt x="1" y="8874"/>
+                  <a:pt x="2569" y="11442"/>
+                  <a:pt x="5705" y="11442"/>
+                </a:cubicBezTo>
+                <a:cubicBezTo>
+                  <a:pt x="8874" y="11442"/>
+                  <a:pt x="11409" y="8874"/>
+                  <a:pt x="11409" y="5738"/>
+                </a:cubicBezTo>
+                <a:cubicBezTo>
+                  <a:pt x="11409" y="2569"/>
+                  <a:pt x="8874" y="1"/>
+                  <a:pt x="5705" y="1"/>
+                </a:cubicBezTo>
+                <a:close/>
+              </a:path>
+            </a:pathLst>
+          </a:custGeom>
+          <a:solidFill>
+            <a:srgbClr val="F3AC3D"/>
+          </a:solidFill>
+          <a:ln>
+            <a:noFill/>
+          </a:ln>
+        </p:spPr>
+        <p:txBody>
+          <a:bodyPr spcFirstLastPara="1" wrap="square" lIns="91425" tIns="91425" rIns="91425" bIns="91425" anchor="ctr" anchorCtr="0">
+            <a:noAutofit/>
+          </a:bodyPr>
+          <a:lstStyle/>
+          <a:p>
+            <a:pPr marL="0" marR="0" lvl="0" indent="0" defTabSz="914400" eaLnBrk="1" fontAlgn="auto" latinLnBrk="0" hangingPunct="1">
+              <a:lnSpc>
+                <a:spcPct val="100000"/>
+              </a:lnSpc>
+              <a:spcBef>
+                <a:spcPts val="0"/>
+              </a:spcBef>
+              <a:spcAft>
+                <a:spcPts val="0"/>
+              </a:spcAft>
+              <a:buClrTx/>
+              <a:buSzTx/>
+              <a:buFontTx/>
+              <a:buNone/>
+              <a:tabLst/>
+              <a:defRPr/>
+            </a:pPr>
+            <a:endParaRPr kumimoji="0" sz="1800" b="0" i="0" u="none" strike="noStrike" kern="0" cap="none" spc="0" normalizeH="0" baseline="0" noProof="0">
+              <a:ln>
+                <a:noFill/>
+              </a:ln>
+              <a:solidFill>
+                <a:sysClr val="windowText" lastClr="000000"/>
+              </a:solidFill>
+              <a:effectLst/>
+              <a:uLnTx/>
+              <a:uFillTx/>
+            </a:endParaRPr>
+          </a:p>
+        </p:txBody>
+      </p:sp>
+      <p:pic>
+        <p:nvPicPr>
+          <p:cNvPr id="2" name="Imagem 5">
+            <a:extLst>
+              <a:ext uri="{FF2B5EF4-FFF2-40B4-BE49-F238E27FC236}">
+                <a16:creationId xmlns:a16="http://schemas.microsoft.com/office/drawing/2014/main" id="{6282391E-2432-9397-654E-BC2D13F60061}"/>
+              </a:ext>
+            </a:extLst>
+          </p:cNvPr>
+          <p:cNvPicPr>
+            <a:picLocks noChangeAspect="1"/>
+          </p:cNvPicPr>
+          <p:nvPr/>
+        </p:nvPicPr>
+        <p:blipFill>
+          <a:blip r:embed="rId2"/>
+          <a:stretch>
+            <a:fillRect/>
+          </a:stretch>
+        </p:blipFill>
+        <p:spPr>
+          <a:xfrm>
+            <a:off x="797415" y="3074739"/>
+            <a:ext cx="2139540" cy="1893144"/>
+          </a:xfrm>
+          <a:prstGeom prst="rect">
+            <a:avLst/>
+          </a:prstGeom>
+        </p:spPr>
+      </p:pic>
+      <p:pic>
+        <p:nvPicPr>
+          <p:cNvPr id="5" name="Imagem 7">
+            <a:extLst>
+              <a:ext uri="{FF2B5EF4-FFF2-40B4-BE49-F238E27FC236}">
+                <a16:creationId xmlns:a16="http://schemas.microsoft.com/office/drawing/2014/main" id="{ED0F57E2-3C9A-1973-5023-ADB94F24FAE9}"/>
+              </a:ext>
+            </a:extLst>
+          </p:cNvPr>
+          <p:cNvPicPr>
+            <a:picLocks noChangeAspect="1"/>
+          </p:cNvPicPr>
+          <p:nvPr/>
+        </p:nvPicPr>
+        <p:blipFill>
+          <a:blip r:embed="rId3"/>
+          <a:stretch>
+            <a:fillRect/>
+          </a:stretch>
+        </p:blipFill>
+        <p:spPr>
+          <a:xfrm>
+            <a:off x="3353684" y="3045198"/>
+            <a:ext cx="2139539" cy="1922685"/>
+          </a:xfrm>
+          <a:prstGeom prst="rect">
+            <a:avLst/>
+          </a:prstGeom>
+        </p:spPr>
+      </p:pic>
+      <p:pic>
+        <p:nvPicPr>
+          <p:cNvPr id="6" name="Imagem 9">
+            <a:extLst>
+              <a:ext uri="{FF2B5EF4-FFF2-40B4-BE49-F238E27FC236}">
+                <a16:creationId xmlns:a16="http://schemas.microsoft.com/office/drawing/2014/main" id="{E18D82B4-B964-C7CA-65FC-F88C5EA71A59}"/>
+              </a:ext>
+            </a:extLst>
+          </p:cNvPr>
+          <p:cNvPicPr>
+            <a:picLocks noChangeAspect="1"/>
+          </p:cNvPicPr>
+          <p:nvPr/>
+        </p:nvPicPr>
+        <p:blipFill>
+          <a:blip r:embed="rId4"/>
+          <a:stretch>
+            <a:fillRect/>
+          </a:stretch>
+        </p:blipFill>
+        <p:spPr>
+          <a:xfrm>
+            <a:off x="5909952" y="3074739"/>
+            <a:ext cx="2139539" cy="1893144"/>
+          </a:xfrm>
+          <a:prstGeom prst="rect">
+            <a:avLst/>
+          </a:prstGeom>
+        </p:spPr>
+      </p:pic>
+    </p:spTree>
+    <p:extLst>
+      <p:ext uri="{BB962C8B-B14F-4D97-AF65-F5344CB8AC3E}">
+        <p14:creationId xmlns:p14="http://schemas.microsoft.com/office/powerpoint/2010/main" val="386153857"/>
       </p:ext>
     </p:extLst>
   </p:cSld>
@@ -28917,10 +29900,55 @@
       </p:sp>
       <p:sp>
         <p:nvSpPr>
-          <p:cNvPr id="3" name="Google Shape;434;p52">
+          <p:cNvPr id="3" name="TextBox 2">
             <a:extLst>
               <a:ext uri="{FF2B5EF4-FFF2-40B4-BE49-F238E27FC236}">
-                <a16:creationId xmlns:a16="http://schemas.microsoft.com/office/drawing/2014/main" id="{EF46354D-A6E4-63B5-858F-119D9C59C264}"/>
+                <a16:creationId xmlns:a16="http://schemas.microsoft.com/office/drawing/2014/main" id="{301DBBFF-0235-0A37-44DC-2796408B1FEB}"/>
+              </a:ext>
+            </a:extLst>
+          </p:cNvPr>
+          <p:cNvSpPr txBox="1"/>
+          <p:nvPr/>
+        </p:nvSpPr>
+        <p:spPr>
+          <a:xfrm>
+            <a:off x="720000" y="1378527"/>
+            <a:ext cx="7329491" cy="307777"/>
+          </a:xfrm>
+          <a:prstGeom prst="rect">
+            <a:avLst/>
+          </a:prstGeom>
+          <a:noFill/>
+        </p:spPr>
+        <p:txBody>
+          <a:bodyPr wrap="square" rtlCol="0">
+            <a:spAutoFit/>
+          </a:bodyPr>
+          <a:lstStyle/>
+          <a:p>
+            <a:pPr marL="285750" indent="-285750" algn="just">
+              <a:buClr>
+                <a:srgbClr val="335B74"/>
+              </a:buClr>
+              <a:buFont typeface="Arial" panose="020B0604020202020204" pitchFamily="34" charset="0"/>
+              <a:buChar char="•"/>
+            </a:pPr>
+            <a:endParaRPr lang="en-US" b="0" dirty="0">
+              <a:solidFill>
+                <a:srgbClr val="335B74"/>
+              </a:solidFill>
+              <a:effectLst/>
+              <a:latin typeface="Söhne"/>
+            </a:endParaRPr>
+          </a:p>
+        </p:txBody>
+      </p:sp>
+      <p:sp>
+        <p:nvSpPr>
+          <p:cNvPr id="4" name="Google Shape;434;p52">
+            <a:extLst>
+              <a:ext uri="{FF2B5EF4-FFF2-40B4-BE49-F238E27FC236}">
+                <a16:creationId xmlns:a16="http://schemas.microsoft.com/office/drawing/2014/main" id="{C2E8DD63-32BB-1945-9EA8-78A7A56DC74A}"/>
               </a:ext>
             </a:extLst>
           </p:cNvPr>
@@ -29011,10 +30039,100 @@
           </a:p>
         </p:txBody>
       </p:sp>
+      <p:pic>
+        <p:nvPicPr>
+          <p:cNvPr id="7" name="Imagem 7" descr="Uma imagem com captura de ecrã, texto, Saturação de cores, diagrama&#10;&#10;Descrição gerada automaticamente">
+            <a:extLst>
+              <a:ext uri="{FF2B5EF4-FFF2-40B4-BE49-F238E27FC236}">
+                <a16:creationId xmlns:a16="http://schemas.microsoft.com/office/drawing/2014/main" id="{E4A90129-1A8D-0FAF-E4D6-F336784FCC82}"/>
+              </a:ext>
+            </a:extLst>
+          </p:cNvPr>
+          <p:cNvPicPr>
+            <a:picLocks noChangeAspect="1"/>
+          </p:cNvPicPr>
+          <p:nvPr/>
+        </p:nvPicPr>
+        <p:blipFill>
+          <a:blip r:embed="rId2"/>
+          <a:stretch>
+            <a:fillRect/>
+          </a:stretch>
+        </p:blipFill>
+        <p:spPr>
+          <a:xfrm>
+            <a:off x="5637696" y="1017725"/>
+            <a:ext cx="3214645" cy="2089748"/>
+          </a:xfrm>
+          <a:prstGeom prst="rect">
+            <a:avLst/>
+          </a:prstGeom>
+        </p:spPr>
+      </p:pic>
+      <p:pic>
+        <p:nvPicPr>
+          <p:cNvPr id="8" name="Imagem 9" descr="Uma imagem com captura de ecrã, texto, Saturação de cores, diagrama&#10;&#10;Descrição gerada automaticamente">
+            <a:extLst>
+              <a:ext uri="{FF2B5EF4-FFF2-40B4-BE49-F238E27FC236}">
+                <a16:creationId xmlns:a16="http://schemas.microsoft.com/office/drawing/2014/main" id="{C0CC265C-6744-65EC-910D-D45049E2725E}"/>
+              </a:ext>
+            </a:extLst>
+          </p:cNvPr>
+          <p:cNvPicPr>
+            <a:picLocks noChangeAspect="1"/>
+          </p:cNvPicPr>
+          <p:nvPr/>
+        </p:nvPicPr>
+        <p:blipFill>
+          <a:blip r:embed="rId3"/>
+          <a:stretch>
+            <a:fillRect/>
+          </a:stretch>
+        </p:blipFill>
+        <p:spPr>
+          <a:xfrm>
+            <a:off x="291659" y="1017725"/>
+            <a:ext cx="3214646" cy="2089748"/>
+          </a:xfrm>
+          <a:prstGeom prst="rect">
+            <a:avLst/>
+          </a:prstGeom>
+        </p:spPr>
+      </p:pic>
+      <p:pic>
+        <p:nvPicPr>
+          <p:cNvPr id="9" name="Imagem 11" descr="Uma imagem com captura de ecrã, texto, Saturação de cores, diagrama&#10;&#10;Descrição gerada automaticamente">
+            <a:extLst>
+              <a:ext uri="{FF2B5EF4-FFF2-40B4-BE49-F238E27FC236}">
+                <a16:creationId xmlns:a16="http://schemas.microsoft.com/office/drawing/2014/main" id="{7C12E9B8-4BC1-4BB7-9FFF-3CA4E096E83C}"/>
+              </a:ext>
+            </a:extLst>
+          </p:cNvPr>
+          <p:cNvPicPr>
+            <a:picLocks noChangeAspect="1"/>
+          </p:cNvPicPr>
+          <p:nvPr/>
+        </p:nvPicPr>
+        <p:blipFill>
+          <a:blip r:embed="rId4"/>
+          <a:stretch>
+            <a:fillRect/>
+          </a:stretch>
+        </p:blipFill>
+        <p:spPr>
+          <a:xfrm>
+            <a:off x="2964677" y="2998797"/>
+            <a:ext cx="3214646" cy="2052525"/>
+          </a:xfrm>
+          <a:prstGeom prst="rect">
+            <a:avLst/>
+          </a:prstGeom>
+        </p:spPr>
+      </p:pic>
     </p:spTree>
     <p:extLst>
       <p:ext uri="{BB962C8B-B14F-4D97-AF65-F5344CB8AC3E}">
-        <p14:creationId xmlns:p14="http://schemas.microsoft.com/office/powerpoint/2010/main" val="1108964355"/>
+        <p14:creationId xmlns:p14="http://schemas.microsoft.com/office/powerpoint/2010/main" val="677650490"/>
       </p:ext>
     </p:extLst>
   </p:cSld>
@@ -29071,7 +30189,7 @@
               <a:t> </a:t>
             </a:r>
             <a:r>
-              <a:rPr lang="pt-PT" sz="2800" dirty="0" err="1"/>
+              <a:rPr lang="pt-PT" sz="2800"/>
               <a:t>Modelling</a:t>
             </a:r>
             <a:endParaRPr lang="pt-PT" sz="2800" dirty="0"/>
@@ -29080,10 +30198,358 @@
       </p:sp>
       <p:sp>
         <p:nvSpPr>
-          <p:cNvPr id="3" name="Google Shape;434;p52">
+          <p:cNvPr id="3" name="TextBox 2">
             <a:extLst>
               <a:ext uri="{FF2B5EF4-FFF2-40B4-BE49-F238E27FC236}">
-                <a16:creationId xmlns:a16="http://schemas.microsoft.com/office/drawing/2014/main" id="{991F166C-3679-E183-06E3-CF8C406C6459}"/>
+                <a16:creationId xmlns:a16="http://schemas.microsoft.com/office/drawing/2014/main" id="{301DBBFF-0235-0A37-44DC-2796408B1FEB}"/>
+              </a:ext>
+            </a:extLst>
+          </p:cNvPr>
+          <p:cNvSpPr txBox="1"/>
+          <p:nvPr/>
+        </p:nvSpPr>
+        <p:spPr>
+          <a:xfrm>
+            <a:off x="720000" y="1378527"/>
+            <a:ext cx="7329491" cy="2462213"/>
+          </a:xfrm>
+          <a:prstGeom prst="rect">
+            <a:avLst/>
+          </a:prstGeom>
+          <a:noFill/>
+        </p:spPr>
+        <p:txBody>
+          <a:bodyPr wrap="square" rtlCol="0">
+            <a:spAutoFit/>
+          </a:bodyPr>
+          <a:lstStyle/>
+          <a:p>
+            <a:pPr marL="285750" indent="-285750" algn="l">
+              <a:buClr>
+                <a:srgbClr val="335B74"/>
+              </a:buClr>
+              <a:buFont typeface="Arial" panose="020B0604020202020204" pitchFamily="34" charset="0"/>
+              <a:buChar char="•"/>
+            </a:pPr>
+            <a:r>
+              <a:rPr lang="en-US" b="1" i="0" dirty="0">
+                <a:solidFill>
+                  <a:srgbClr val="335B74"/>
+                </a:solidFill>
+                <a:effectLst/>
+                <a:latin typeface="Söhne"/>
+              </a:rPr>
+              <a:t>Imbalanced Data:</a:t>
+            </a:r>
+            <a:r>
+              <a:rPr lang="en-US" b="0" i="0" dirty="0">
+                <a:solidFill>
+                  <a:srgbClr val="335B74"/>
+                </a:solidFill>
+                <a:effectLst/>
+                <a:latin typeface="Söhne"/>
+              </a:rPr>
+              <a:t> We used </a:t>
+            </a:r>
+            <a:r>
+              <a:rPr lang="en-US" i="0" dirty="0">
+                <a:solidFill>
+                  <a:srgbClr val="335B74"/>
+                </a:solidFill>
+                <a:effectLst/>
+                <a:latin typeface="Söhne"/>
+              </a:rPr>
+              <a:t>SMOTE</a:t>
+            </a:r>
+            <a:r>
+              <a:rPr lang="en-US" b="0" i="0" dirty="0">
+                <a:solidFill>
+                  <a:srgbClr val="335B74"/>
+                </a:solidFill>
+                <a:effectLst/>
+                <a:latin typeface="Söhne"/>
+              </a:rPr>
+              <a:t> (Synthetic Minority Over-sampling Technique) to address class imbalance in the target variable.</a:t>
+            </a:r>
+          </a:p>
+          <a:p>
+            <a:pPr marL="285750" indent="-285750" algn="l">
+              <a:buClr>
+                <a:srgbClr val="335B74"/>
+              </a:buClr>
+              <a:buFont typeface="Arial" panose="020B0604020202020204" pitchFamily="34" charset="0"/>
+              <a:buChar char="•"/>
+            </a:pPr>
+            <a:endParaRPr lang="en-US" b="0" i="0" dirty="0">
+              <a:solidFill>
+                <a:srgbClr val="335B74"/>
+              </a:solidFill>
+              <a:effectLst/>
+              <a:latin typeface="Söhne"/>
+            </a:endParaRPr>
+          </a:p>
+          <a:p>
+            <a:pPr marL="285750" lvl="1" indent="-285750">
+              <a:buClr>
+                <a:srgbClr val="335B74"/>
+              </a:buClr>
+              <a:buFont typeface="Arial" panose="020B0604020202020204" pitchFamily="34" charset="0"/>
+              <a:buChar char="•"/>
+            </a:pPr>
+            <a:r>
+              <a:rPr lang="en-US" b="1" i="0" dirty="0">
+                <a:solidFill>
+                  <a:srgbClr val="335B74"/>
+                </a:solidFill>
+                <a:effectLst/>
+                <a:latin typeface="Söhne"/>
+              </a:rPr>
+              <a:t>Feature Scaling:</a:t>
+            </a:r>
+            <a:r>
+              <a:rPr lang="en-US" b="0" i="0" dirty="0">
+                <a:solidFill>
+                  <a:srgbClr val="335B74"/>
+                </a:solidFill>
+                <a:effectLst/>
+                <a:latin typeface="Söhne"/>
+              </a:rPr>
+              <a:t> </a:t>
+            </a:r>
+            <a:r>
+              <a:rPr lang="en-US" dirty="0">
+                <a:solidFill>
+                  <a:srgbClr val="335B74"/>
+                </a:solidFill>
+                <a:latin typeface="Söhne"/>
+              </a:rPr>
+              <a:t>T</a:t>
+            </a:r>
+            <a:r>
+              <a:rPr lang="en-US" b="0" i="0" dirty="0">
+                <a:solidFill>
+                  <a:srgbClr val="335B74"/>
+                </a:solidFill>
+                <a:effectLst/>
+                <a:latin typeface="Söhne"/>
+              </a:rPr>
+              <a:t>o ensure that all features contributed equally to the model we used feature scaling using </a:t>
+            </a:r>
+            <a:r>
+              <a:rPr lang="en-US" b="0" i="0" dirty="0" err="1">
+                <a:solidFill>
+                  <a:srgbClr val="335B74"/>
+                </a:solidFill>
+                <a:effectLst/>
+                <a:latin typeface="Söhne"/>
+              </a:rPr>
+              <a:t>StandardScaler</a:t>
+            </a:r>
+            <a:r>
+              <a:rPr lang="en-US" b="0" i="0" dirty="0">
+                <a:solidFill>
+                  <a:srgbClr val="335B74"/>
+                </a:solidFill>
+                <a:effectLst/>
+                <a:latin typeface="Söhne"/>
+              </a:rPr>
+              <a:t>.</a:t>
+            </a:r>
+          </a:p>
+          <a:p>
+            <a:pPr algn="l">
+              <a:buClr>
+                <a:srgbClr val="335B74"/>
+              </a:buClr>
+            </a:pPr>
+            <a:endParaRPr lang="en-US" dirty="0">
+              <a:solidFill>
+                <a:srgbClr val="335B74"/>
+              </a:solidFill>
+              <a:latin typeface="Söhne"/>
+            </a:endParaRPr>
+          </a:p>
+          <a:p>
+            <a:pPr marL="285750" indent="-285750">
+              <a:buClr>
+                <a:srgbClr val="335B74"/>
+              </a:buClr>
+              <a:buFont typeface="Arial" panose="020B0604020202020204" pitchFamily="34" charset="0"/>
+              <a:buChar char="•"/>
+            </a:pPr>
+            <a:r>
+              <a:rPr lang="en-US" b="1" i="0" dirty="0">
+                <a:solidFill>
+                  <a:srgbClr val="335B74"/>
+                </a:solidFill>
+                <a:effectLst/>
+                <a:latin typeface="Söhne"/>
+              </a:rPr>
+              <a:t>Algorithms used:</a:t>
+            </a:r>
+            <a:r>
+              <a:rPr lang="en-US" b="0" i="0" dirty="0">
+                <a:solidFill>
+                  <a:srgbClr val="335B74"/>
+                </a:solidFill>
+                <a:effectLst/>
+                <a:latin typeface="Söhne"/>
+              </a:rPr>
+              <a:t> Decision Tree, Support Vector Machine, K-nearest Neighbors, Neural Networks, Random Forest (Randomized Search Cross-Validation was used to optimize the hyperparameters of each algorithm).</a:t>
+            </a:r>
+          </a:p>
+          <a:p>
+            <a:pPr marL="285750" indent="-285750">
+              <a:buClr>
+                <a:srgbClr val="335B74"/>
+              </a:buClr>
+              <a:buFont typeface="Arial" panose="020B0604020202020204" pitchFamily="34" charset="0"/>
+              <a:buChar char="•"/>
+            </a:pPr>
+            <a:endParaRPr lang="en-US" dirty="0">
+              <a:solidFill>
+                <a:srgbClr val="335B74"/>
+              </a:solidFill>
+              <a:latin typeface="Söhne"/>
+            </a:endParaRPr>
+          </a:p>
+          <a:p>
+            <a:pPr marL="285750" indent="-285750">
+              <a:buClr>
+                <a:srgbClr val="335B74"/>
+              </a:buClr>
+              <a:buFont typeface="Arial" panose="020B0604020202020204" pitchFamily="34" charset="0"/>
+              <a:buChar char="•"/>
+            </a:pPr>
+            <a:r>
+              <a:rPr lang="en-US" b="0" i="1" dirty="0" err="1">
+                <a:solidFill>
+                  <a:srgbClr val="335B74"/>
+                </a:solidFill>
+                <a:effectLst/>
+                <a:latin typeface="Söhne"/>
+              </a:rPr>
+              <a:t>average_amount_of_transactions</a:t>
+            </a:r>
+            <a:r>
+              <a:rPr lang="en-US" b="0" dirty="0">
+                <a:solidFill>
+                  <a:srgbClr val="335B74"/>
+                </a:solidFill>
+                <a:effectLst/>
+                <a:latin typeface="Söhne"/>
+              </a:rPr>
+              <a:t>,</a:t>
+            </a:r>
+            <a:r>
+              <a:rPr lang="en-US" b="0" i="1" dirty="0">
+                <a:solidFill>
+                  <a:srgbClr val="335B74"/>
+                </a:solidFill>
+                <a:effectLst/>
+                <a:latin typeface="Söhne"/>
+              </a:rPr>
+              <a:t> payments</a:t>
+            </a:r>
+            <a:r>
+              <a:rPr lang="en-US" b="0" dirty="0">
+                <a:solidFill>
+                  <a:srgbClr val="335B74"/>
+                </a:solidFill>
+                <a:effectLst/>
+                <a:latin typeface="Söhne"/>
+              </a:rPr>
+              <a:t>,</a:t>
+            </a:r>
+            <a:r>
+              <a:rPr lang="en-US" b="0" i="1" dirty="0">
+                <a:solidFill>
+                  <a:srgbClr val="335B74"/>
+                </a:solidFill>
+                <a:effectLst/>
+                <a:latin typeface="Söhne"/>
+              </a:rPr>
+              <a:t> </a:t>
+            </a:r>
+            <a:r>
+              <a:rPr lang="en-US" b="0" i="1" dirty="0" err="1">
+                <a:solidFill>
+                  <a:srgbClr val="335B74"/>
+                </a:solidFill>
+                <a:effectLst/>
+                <a:latin typeface="Söhne"/>
+              </a:rPr>
+              <a:t>district_rank</a:t>
+            </a:r>
+            <a:r>
+              <a:rPr lang="en-US" b="0" dirty="0">
+                <a:solidFill>
+                  <a:srgbClr val="335B74"/>
+                </a:solidFill>
+                <a:effectLst/>
+                <a:latin typeface="Söhne"/>
+              </a:rPr>
+              <a:t>,</a:t>
+            </a:r>
+            <a:r>
+              <a:rPr lang="en-US" b="0" i="1" dirty="0">
+                <a:solidFill>
+                  <a:srgbClr val="335B74"/>
+                </a:solidFill>
+                <a:effectLst/>
+                <a:latin typeface="Söhne"/>
+              </a:rPr>
+              <a:t> age</a:t>
+            </a:r>
+            <a:r>
+              <a:rPr lang="en-US" b="0" dirty="0">
+                <a:solidFill>
+                  <a:srgbClr val="335B74"/>
+                </a:solidFill>
+                <a:effectLst/>
+                <a:latin typeface="Söhne"/>
+              </a:rPr>
+              <a:t>,</a:t>
+            </a:r>
+            <a:r>
+              <a:rPr lang="en-US" b="0" i="1" dirty="0">
+                <a:solidFill>
+                  <a:srgbClr val="335B74"/>
+                </a:solidFill>
+                <a:effectLst/>
+                <a:latin typeface="Söhne"/>
+              </a:rPr>
+              <a:t> amount</a:t>
+            </a:r>
+            <a:r>
+              <a:rPr lang="en-US" b="0" dirty="0">
+                <a:solidFill>
+                  <a:srgbClr val="335B74"/>
+                </a:solidFill>
+                <a:effectLst/>
+                <a:latin typeface="Söhne"/>
+              </a:rPr>
+              <a:t>,</a:t>
+            </a:r>
+            <a:r>
+              <a:rPr lang="en-US" b="0" i="1" dirty="0">
+                <a:solidFill>
+                  <a:srgbClr val="335B74"/>
+                </a:solidFill>
+                <a:effectLst/>
+                <a:latin typeface="Söhne"/>
+              </a:rPr>
+              <a:t> status</a:t>
+            </a:r>
+          </a:p>
+        </p:txBody>
+      </p:sp>
+      <p:sp>
+        <p:nvSpPr>
+          <p:cNvPr id="2" name="Google Shape;434;p52">
+            <a:extLst>
+              <a:ext uri="{FF2B5EF4-FFF2-40B4-BE49-F238E27FC236}">
+                <a16:creationId xmlns:a16="http://schemas.microsoft.com/office/drawing/2014/main" id="{9DD58EF7-0644-2403-1852-B532203B17F4}"/>
               </a:ext>
             </a:extLst>
           </p:cNvPr>
@@ -29177,7 +30643,7 @@
     </p:spTree>
     <p:extLst>
       <p:ext uri="{BB962C8B-B14F-4D97-AF65-F5344CB8AC3E}">
-        <p14:creationId xmlns:p14="http://schemas.microsoft.com/office/powerpoint/2010/main" val="1529084567"/>
+        <p14:creationId xmlns:p14="http://schemas.microsoft.com/office/powerpoint/2010/main" val="3936280051"/>
       </p:ext>
     </p:extLst>
   </p:cSld>

</xml_diff>